<commit_message>
Creating user journey and persona
</commit_message>
<xml_diff>
--- a/CV/CV Planning.pptx
+++ b/CV/CV Planning.pptx
@@ -15,6 +15,9 @@
     <p:sldId id="265" r:id="rId9"/>
     <p:sldId id="266" r:id="rId10"/>
     <p:sldId id="267" r:id="rId11"/>
+    <p:sldId id="268" r:id="rId12"/>
+    <p:sldId id="269" r:id="rId13"/>
+    <p:sldId id="270" r:id="rId14"/>
   </p:sldIdLst>
   <p:sldSz cx="12192000" cy="6858000"/>
   <p:notesSz cx="6858000" cy="9144000"/>
@@ -270,7 +273,7 @@
           <a:p>
             <a:fld id="{C5CCD5CF-7199-41FC-B342-DC83E296C7CF}" type="datetimeFigureOut">
               <a:rPr lang="en-GB" smtClean="0"/>
-              <a:t>26/10/2023</a:t>
+              <a:t>27/10/2023</a:t>
             </a:fld>
             <a:endParaRPr lang="en-GB"/>
           </a:p>
@@ -470,7 +473,7 @@
           <a:p>
             <a:fld id="{C5CCD5CF-7199-41FC-B342-DC83E296C7CF}" type="datetimeFigureOut">
               <a:rPr lang="en-GB" smtClean="0"/>
-              <a:t>26/10/2023</a:t>
+              <a:t>27/10/2023</a:t>
             </a:fld>
             <a:endParaRPr lang="en-GB"/>
           </a:p>
@@ -680,7 +683,7 @@
           <a:p>
             <a:fld id="{C5CCD5CF-7199-41FC-B342-DC83E296C7CF}" type="datetimeFigureOut">
               <a:rPr lang="en-GB" smtClean="0"/>
-              <a:t>26/10/2023</a:t>
+              <a:t>27/10/2023</a:t>
             </a:fld>
             <a:endParaRPr lang="en-GB"/>
           </a:p>
@@ -880,7 +883,7 @@
           <a:p>
             <a:fld id="{C5CCD5CF-7199-41FC-B342-DC83E296C7CF}" type="datetimeFigureOut">
               <a:rPr lang="en-GB" smtClean="0"/>
-              <a:t>26/10/2023</a:t>
+              <a:t>27/10/2023</a:t>
             </a:fld>
             <a:endParaRPr lang="en-GB"/>
           </a:p>
@@ -1156,7 +1159,7 @@
           <a:p>
             <a:fld id="{C5CCD5CF-7199-41FC-B342-DC83E296C7CF}" type="datetimeFigureOut">
               <a:rPr lang="en-GB" smtClean="0"/>
-              <a:t>26/10/2023</a:t>
+              <a:t>27/10/2023</a:t>
             </a:fld>
             <a:endParaRPr lang="en-GB"/>
           </a:p>
@@ -1424,7 +1427,7 @@
           <a:p>
             <a:fld id="{C5CCD5CF-7199-41FC-B342-DC83E296C7CF}" type="datetimeFigureOut">
               <a:rPr lang="en-GB" smtClean="0"/>
-              <a:t>26/10/2023</a:t>
+              <a:t>27/10/2023</a:t>
             </a:fld>
             <a:endParaRPr lang="en-GB"/>
           </a:p>
@@ -1839,7 +1842,7 @@
           <a:p>
             <a:fld id="{C5CCD5CF-7199-41FC-B342-DC83E296C7CF}" type="datetimeFigureOut">
               <a:rPr lang="en-GB" smtClean="0"/>
-              <a:t>26/10/2023</a:t>
+              <a:t>27/10/2023</a:t>
             </a:fld>
             <a:endParaRPr lang="en-GB"/>
           </a:p>
@@ -1981,7 +1984,7 @@
           <a:p>
             <a:fld id="{C5CCD5CF-7199-41FC-B342-DC83E296C7CF}" type="datetimeFigureOut">
               <a:rPr lang="en-GB" smtClean="0"/>
-              <a:t>26/10/2023</a:t>
+              <a:t>27/10/2023</a:t>
             </a:fld>
             <a:endParaRPr lang="en-GB"/>
           </a:p>
@@ -2094,7 +2097,7 @@
           <a:p>
             <a:fld id="{C5CCD5CF-7199-41FC-B342-DC83E296C7CF}" type="datetimeFigureOut">
               <a:rPr lang="en-GB" smtClean="0"/>
-              <a:t>26/10/2023</a:t>
+              <a:t>27/10/2023</a:t>
             </a:fld>
             <a:endParaRPr lang="en-GB"/>
           </a:p>
@@ -2407,7 +2410,7 @@
           <a:p>
             <a:fld id="{C5CCD5CF-7199-41FC-B342-DC83E296C7CF}" type="datetimeFigureOut">
               <a:rPr lang="en-GB" smtClean="0"/>
-              <a:t>26/10/2023</a:t>
+              <a:t>27/10/2023</a:t>
             </a:fld>
             <a:endParaRPr lang="en-GB"/>
           </a:p>
@@ -2696,7 +2699,7 @@
           <a:p>
             <a:fld id="{C5CCD5CF-7199-41FC-B342-DC83E296C7CF}" type="datetimeFigureOut">
               <a:rPr lang="en-GB" smtClean="0"/>
-              <a:t>26/10/2023</a:t>
+              <a:t>27/10/2023</a:t>
             </a:fld>
             <a:endParaRPr lang="en-GB"/>
           </a:p>
@@ -2939,7 +2942,7 @@
           <a:p>
             <a:fld id="{C5CCD5CF-7199-41FC-B342-DC83E296C7CF}" type="datetimeFigureOut">
               <a:rPr lang="en-GB" smtClean="0"/>
-              <a:t>26/10/2023</a:t>
+              <a:t>27/10/2023</a:t>
             </a:fld>
             <a:endParaRPr lang="en-GB"/>
           </a:p>
@@ -3573,7 +3576,7 @@
           <p:cNvPr id="2" name="Title 1">
             <a:extLst>
               <a:ext uri="{FF2B5EF4-FFF2-40B4-BE49-F238E27FC236}">
-                <a16:creationId xmlns:a16="http://schemas.microsoft.com/office/drawing/2014/main" id="{3390EE4E-AF75-9A21-4D7D-E4203CDC1CC8}"/>
+                <a16:creationId xmlns:a16="http://schemas.microsoft.com/office/drawing/2014/main" id="{539AB629-3A8A-B7D8-20E4-F862884889D9}"/>
               </a:ext>
             </a:extLst>
           </p:cNvPr>
@@ -3589,24 +3592,27 @@
           <a:bodyPr/>
           <a:lstStyle/>
           <a:p>
-            <a:endParaRPr lang="en-GB"/>
-          </a:p>
-        </p:txBody>
-      </p:sp>
-      <p:sp>
-        <p:nvSpPr>
-          <p:cNvPr id="3" name="Text Placeholder 2">
-            <a:extLst>
-              <a:ext uri="{FF2B5EF4-FFF2-40B4-BE49-F238E27FC236}">
-                <a16:creationId xmlns:a16="http://schemas.microsoft.com/office/drawing/2014/main" id="{8693DB58-A2DB-1870-10BD-8E92C1255B1F}"/>
-              </a:ext>
-            </a:extLst>
-          </p:cNvPr>
-          <p:cNvSpPr>
-            <a:spLocks noGrp="1"/>
-          </p:cNvSpPr>
-          <p:nvPr>
-            <p:ph type="body" idx="1"/>
+            <a:r>
+              <a:rPr lang="en-GB" dirty="0"/>
+              <a:t>Calibri</a:t>
+            </a:r>
+          </a:p>
+        </p:txBody>
+      </p:sp>
+      <p:sp>
+        <p:nvSpPr>
+          <p:cNvPr id="3" name="Content Placeholder 2">
+            <a:extLst>
+              <a:ext uri="{FF2B5EF4-FFF2-40B4-BE49-F238E27FC236}">
+                <a16:creationId xmlns:a16="http://schemas.microsoft.com/office/drawing/2014/main" id="{4780F379-B09C-400A-9F37-5C5D832281D5}"/>
+              </a:ext>
+            </a:extLst>
+          </p:cNvPr>
+          <p:cNvSpPr>
+            <a:spLocks noGrp="1"/>
+          </p:cNvSpPr>
+          <p:nvPr>
+            <p:ph idx="1"/>
           </p:nvPr>
         </p:nvSpPr>
         <p:spPr/>
@@ -3614,89 +3620,1504 @@
           <a:bodyPr/>
           <a:lstStyle/>
           <a:p>
-            <a:endParaRPr lang="en-GB"/>
-          </a:p>
-        </p:txBody>
-      </p:sp>
-      <p:sp>
-        <p:nvSpPr>
-          <p:cNvPr id="4" name="Content Placeholder 3">
-            <a:extLst>
-              <a:ext uri="{FF2B5EF4-FFF2-40B4-BE49-F238E27FC236}">
-                <a16:creationId xmlns:a16="http://schemas.microsoft.com/office/drawing/2014/main" id="{61FCB5C6-F15C-75F5-721A-4B996F9D3971}"/>
-              </a:ext>
-            </a:extLst>
-          </p:cNvPr>
-          <p:cNvSpPr>
-            <a:spLocks noGrp="1"/>
-          </p:cNvSpPr>
-          <p:nvPr>
-            <p:ph sz="half" idx="2"/>
-          </p:nvPr>
-        </p:nvSpPr>
-        <p:spPr/>
-        <p:txBody>
-          <a:bodyPr/>
-          <a:lstStyle/>
-          <a:p>
-            <a:endParaRPr lang="en-GB"/>
-          </a:p>
-        </p:txBody>
-      </p:sp>
-      <p:sp>
-        <p:nvSpPr>
-          <p:cNvPr id="5" name="Text Placeholder 4">
-            <a:extLst>
-              <a:ext uri="{FF2B5EF4-FFF2-40B4-BE49-F238E27FC236}">
-                <a16:creationId xmlns:a16="http://schemas.microsoft.com/office/drawing/2014/main" id="{1E03B2E3-CC15-AA55-84DA-194E7A63955A}"/>
-              </a:ext>
-            </a:extLst>
-          </p:cNvPr>
-          <p:cNvSpPr>
-            <a:spLocks noGrp="1"/>
-          </p:cNvSpPr>
-          <p:nvPr>
-            <p:ph type="body" sz="quarter" idx="3"/>
-          </p:nvPr>
-        </p:nvSpPr>
-        <p:spPr/>
-        <p:txBody>
-          <a:bodyPr/>
-          <a:lstStyle/>
-          <a:p>
-            <a:endParaRPr lang="en-GB"/>
-          </a:p>
-        </p:txBody>
-      </p:sp>
-      <p:sp>
-        <p:nvSpPr>
-          <p:cNvPr id="6" name="Content Placeholder 5">
-            <a:extLst>
-              <a:ext uri="{FF2B5EF4-FFF2-40B4-BE49-F238E27FC236}">
-                <a16:creationId xmlns:a16="http://schemas.microsoft.com/office/drawing/2014/main" id="{DF7C74D7-2222-32DF-1291-BCA7116DAC09}"/>
-              </a:ext>
-            </a:extLst>
-          </p:cNvPr>
-          <p:cNvSpPr>
-            <a:spLocks noGrp="1"/>
-          </p:cNvSpPr>
-          <p:nvPr>
-            <p:ph sz="quarter" idx="4"/>
-          </p:nvPr>
-        </p:nvSpPr>
-        <p:spPr/>
-        <p:txBody>
-          <a:bodyPr/>
-          <a:lstStyle/>
-          <a:p>
-            <a:endParaRPr lang="en-GB"/>
+            <a:pPr marL="0" indent="0">
+              <a:buNone/>
+            </a:pPr>
+            <a:r>
+              <a:rPr lang="en-GB" sz="3200" b="0" i="0" dirty="0">
+                <a:solidFill>
+                  <a:srgbClr val="000000"/>
+                </a:solidFill>
+                <a:effectLst/>
+                <a:latin typeface="Calibri" panose="020F0502020204030204" pitchFamily="34" charset="0"/>
+                <a:ea typeface="Calibri" panose="020F0502020204030204" pitchFamily="34" charset="0"/>
+                <a:cs typeface="Calibri" panose="020F0502020204030204" pitchFamily="34" charset="0"/>
+              </a:rPr>
+              <a:t>Lorem ipsum </a:t>
+            </a:r>
+            <a:r>
+              <a:rPr lang="en-GB" sz="3200" b="0" i="0" dirty="0" err="1">
+                <a:solidFill>
+                  <a:srgbClr val="000000"/>
+                </a:solidFill>
+                <a:effectLst/>
+                <a:latin typeface="Calibri" panose="020F0502020204030204" pitchFamily="34" charset="0"/>
+                <a:ea typeface="Calibri" panose="020F0502020204030204" pitchFamily="34" charset="0"/>
+                <a:cs typeface="Calibri" panose="020F0502020204030204" pitchFamily="34" charset="0"/>
+              </a:rPr>
+              <a:t>dolor</a:t>
+            </a:r>
+            <a:r>
+              <a:rPr lang="en-GB" sz="3200" b="0" i="0" dirty="0">
+                <a:solidFill>
+                  <a:srgbClr val="000000"/>
+                </a:solidFill>
+                <a:effectLst/>
+                <a:latin typeface="Calibri" panose="020F0502020204030204" pitchFamily="34" charset="0"/>
+                <a:ea typeface="Calibri" panose="020F0502020204030204" pitchFamily="34" charset="0"/>
+                <a:cs typeface="Calibri" panose="020F0502020204030204" pitchFamily="34" charset="0"/>
+              </a:rPr>
+              <a:t> sit </a:t>
+            </a:r>
+            <a:r>
+              <a:rPr lang="en-GB" sz="3200" b="0" i="0" dirty="0" err="1">
+                <a:solidFill>
+                  <a:srgbClr val="000000"/>
+                </a:solidFill>
+                <a:effectLst/>
+                <a:latin typeface="Calibri" panose="020F0502020204030204" pitchFamily="34" charset="0"/>
+                <a:ea typeface="Calibri" panose="020F0502020204030204" pitchFamily="34" charset="0"/>
+                <a:cs typeface="Calibri" panose="020F0502020204030204" pitchFamily="34" charset="0"/>
+              </a:rPr>
+              <a:t>amet</a:t>
+            </a:r>
+            <a:endParaRPr lang="en-GB" sz="3200" b="0" i="0" dirty="0">
+              <a:solidFill>
+                <a:srgbClr val="000000"/>
+              </a:solidFill>
+              <a:effectLst/>
+              <a:latin typeface="Calibri" panose="020F0502020204030204" pitchFamily="34" charset="0"/>
+              <a:ea typeface="Calibri" panose="020F0502020204030204" pitchFamily="34" charset="0"/>
+              <a:cs typeface="Calibri" panose="020F0502020204030204" pitchFamily="34" charset="0"/>
+            </a:endParaRPr>
+          </a:p>
+          <a:p>
+            <a:pPr marL="0" indent="0">
+              <a:buNone/>
+            </a:pPr>
+            <a:r>
+              <a:rPr lang="en-GB" sz="2400" b="0" i="0" dirty="0">
+                <a:solidFill>
+                  <a:srgbClr val="000000"/>
+                </a:solidFill>
+                <a:effectLst/>
+                <a:latin typeface="Calibri" panose="020F0502020204030204" pitchFamily="34" charset="0"/>
+                <a:ea typeface="Calibri" panose="020F0502020204030204" pitchFamily="34" charset="0"/>
+                <a:cs typeface="Calibri" panose="020F0502020204030204" pitchFamily="34" charset="0"/>
+              </a:rPr>
+              <a:t>Lorem ipsum </a:t>
+            </a:r>
+            <a:r>
+              <a:rPr lang="en-GB" sz="2400" b="0" i="0" dirty="0" err="1">
+                <a:solidFill>
+                  <a:srgbClr val="000000"/>
+                </a:solidFill>
+                <a:effectLst/>
+                <a:latin typeface="Calibri" panose="020F0502020204030204" pitchFamily="34" charset="0"/>
+                <a:ea typeface="Calibri" panose="020F0502020204030204" pitchFamily="34" charset="0"/>
+                <a:cs typeface="Calibri" panose="020F0502020204030204" pitchFamily="34" charset="0"/>
+              </a:rPr>
+              <a:t>dolor</a:t>
+            </a:r>
+            <a:r>
+              <a:rPr lang="en-GB" sz="2400" b="0" i="0" dirty="0">
+                <a:solidFill>
+                  <a:srgbClr val="000000"/>
+                </a:solidFill>
+                <a:effectLst/>
+                <a:latin typeface="Calibri" panose="020F0502020204030204" pitchFamily="34" charset="0"/>
+                <a:ea typeface="Calibri" panose="020F0502020204030204" pitchFamily="34" charset="0"/>
+                <a:cs typeface="Calibri" panose="020F0502020204030204" pitchFamily="34" charset="0"/>
+              </a:rPr>
+              <a:t> sit </a:t>
+            </a:r>
+            <a:r>
+              <a:rPr lang="en-GB" sz="2400" b="0" i="0" dirty="0" err="1">
+                <a:solidFill>
+                  <a:srgbClr val="000000"/>
+                </a:solidFill>
+                <a:effectLst/>
+                <a:latin typeface="Calibri" panose="020F0502020204030204" pitchFamily="34" charset="0"/>
+                <a:ea typeface="Calibri" panose="020F0502020204030204" pitchFamily="34" charset="0"/>
+                <a:cs typeface="Calibri" panose="020F0502020204030204" pitchFamily="34" charset="0"/>
+              </a:rPr>
+              <a:t>amet</a:t>
+            </a:r>
+            <a:endParaRPr lang="en-GB" sz="2400" b="0" i="0" dirty="0">
+              <a:solidFill>
+                <a:srgbClr val="000000"/>
+              </a:solidFill>
+              <a:effectLst/>
+              <a:latin typeface="Calibri" panose="020F0502020204030204" pitchFamily="34" charset="0"/>
+              <a:ea typeface="Calibri" panose="020F0502020204030204" pitchFamily="34" charset="0"/>
+              <a:cs typeface="Calibri" panose="020F0502020204030204" pitchFamily="34" charset="0"/>
+            </a:endParaRPr>
+          </a:p>
+          <a:p>
+            <a:pPr marL="0" indent="0">
+              <a:buNone/>
+            </a:pPr>
+            <a:r>
+              <a:rPr lang="en-GB" sz="2000" b="0" i="0" dirty="0">
+                <a:solidFill>
+                  <a:srgbClr val="000000"/>
+                </a:solidFill>
+                <a:effectLst/>
+                <a:latin typeface="Calibri" panose="020F0502020204030204" pitchFamily="34" charset="0"/>
+                <a:ea typeface="Calibri" panose="020F0502020204030204" pitchFamily="34" charset="0"/>
+                <a:cs typeface="Calibri" panose="020F0502020204030204" pitchFamily="34" charset="0"/>
+              </a:rPr>
+              <a:t>Lorem ipsum </a:t>
+            </a:r>
+            <a:r>
+              <a:rPr lang="en-GB" sz="2000" b="0" i="0" dirty="0" err="1">
+                <a:solidFill>
+                  <a:srgbClr val="000000"/>
+                </a:solidFill>
+                <a:effectLst/>
+                <a:latin typeface="Calibri" panose="020F0502020204030204" pitchFamily="34" charset="0"/>
+                <a:ea typeface="Calibri" panose="020F0502020204030204" pitchFamily="34" charset="0"/>
+                <a:cs typeface="Calibri" panose="020F0502020204030204" pitchFamily="34" charset="0"/>
+              </a:rPr>
+              <a:t>dolor</a:t>
+            </a:r>
+            <a:r>
+              <a:rPr lang="en-GB" sz="2000" b="0" i="0" dirty="0">
+                <a:solidFill>
+                  <a:srgbClr val="000000"/>
+                </a:solidFill>
+                <a:effectLst/>
+                <a:latin typeface="Calibri" panose="020F0502020204030204" pitchFamily="34" charset="0"/>
+                <a:ea typeface="Calibri" panose="020F0502020204030204" pitchFamily="34" charset="0"/>
+                <a:cs typeface="Calibri" panose="020F0502020204030204" pitchFamily="34" charset="0"/>
+              </a:rPr>
+              <a:t> sit </a:t>
+            </a:r>
+            <a:r>
+              <a:rPr lang="en-GB" sz="2000" b="0" i="0" dirty="0" err="1">
+                <a:solidFill>
+                  <a:srgbClr val="000000"/>
+                </a:solidFill>
+                <a:effectLst/>
+                <a:latin typeface="Calibri" panose="020F0502020204030204" pitchFamily="34" charset="0"/>
+                <a:ea typeface="Calibri" panose="020F0502020204030204" pitchFamily="34" charset="0"/>
+                <a:cs typeface="Calibri" panose="020F0502020204030204" pitchFamily="34" charset="0"/>
+              </a:rPr>
+              <a:t>amet</a:t>
+            </a:r>
+            <a:endParaRPr lang="en-GB" sz="2000" dirty="0">
+              <a:solidFill>
+                <a:srgbClr val="000000"/>
+              </a:solidFill>
+              <a:latin typeface="Calibri" panose="020F0502020204030204" pitchFamily="34" charset="0"/>
+              <a:ea typeface="Calibri" panose="020F0502020204030204" pitchFamily="34" charset="0"/>
+              <a:cs typeface="Calibri" panose="020F0502020204030204" pitchFamily="34" charset="0"/>
+            </a:endParaRPr>
+          </a:p>
+          <a:p>
+            <a:pPr marL="0" indent="0">
+              <a:buNone/>
+            </a:pPr>
+            <a:r>
+              <a:rPr lang="en-GB" sz="1600" b="0" i="0" dirty="0">
+                <a:solidFill>
+                  <a:srgbClr val="000000"/>
+                </a:solidFill>
+                <a:effectLst/>
+                <a:latin typeface="Calibri" panose="020F0502020204030204" pitchFamily="34" charset="0"/>
+                <a:ea typeface="Calibri" panose="020F0502020204030204" pitchFamily="34" charset="0"/>
+                <a:cs typeface="Calibri" panose="020F0502020204030204" pitchFamily="34" charset="0"/>
+              </a:rPr>
+              <a:t>Lorem ipsum </a:t>
+            </a:r>
+            <a:r>
+              <a:rPr lang="en-GB" sz="1600" b="0" i="0" dirty="0" err="1">
+                <a:solidFill>
+                  <a:srgbClr val="000000"/>
+                </a:solidFill>
+                <a:effectLst/>
+                <a:latin typeface="Calibri" panose="020F0502020204030204" pitchFamily="34" charset="0"/>
+                <a:ea typeface="Calibri" panose="020F0502020204030204" pitchFamily="34" charset="0"/>
+                <a:cs typeface="Calibri" panose="020F0502020204030204" pitchFamily="34" charset="0"/>
+              </a:rPr>
+              <a:t>dolor</a:t>
+            </a:r>
+            <a:r>
+              <a:rPr lang="en-GB" sz="1600" b="0" i="0" dirty="0">
+                <a:solidFill>
+                  <a:srgbClr val="000000"/>
+                </a:solidFill>
+                <a:effectLst/>
+                <a:latin typeface="Calibri" panose="020F0502020204030204" pitchFamily="34" charset="0"/>
+                <a:ea typeface="Calibri" panose="020F0502020204030204" pitchFamily="34" charset="0"/>
+                <a:cs typeface="Calibri" panose="020F0502020204030204" pitchFamily="34" charset="0"/>
+              </a:rPr>
+              <a:t> sit </a:t>
+            </a:r>
+            <a:r>
+              <a:rPr lang="en-GB" sz="1600" b="0" i="0" dirty="0" err="1">
+                <a:solidFill>
+                  <a:srgbClr val="000000"/>
+                </a:solidFill>
+                <a:effectLst/>
+                <a:latin typeface="Calibri" panose="020F0502020204030204" pitchFamily="34" charset="0"/>
+                <a:ea typeface="Calibri" panose="020F0502020204030204" pitchFamily="34" charset="0"/>
+                <a:cs typeface="Calibri" panose="020F0502020204030204" pitchFamily="34" charset="0"/>
+              </a:rPr>
+              <a:t>amet</a:t>
+            </a:r>
+            <a:endParaRPr lang="en-GB" sz="1600" dirty="0">
+              <a:latin typeface="Calibri" panose="020F0502020204030204" pitchFamily="34" charset="0"/>
+              <a:ea typeface="Calibri" panose="020F0502020204030204" pitchFamily="34" charset="0"/>
+              <a:cs typeface="Calibri" panose="020F0502020204030204" pitchFamily="34" charset="0"/>
+            </a:endParaRPr>
+          </a:p>
+          <a:p>
+            <a:pPr marL="0" indent="0">
+              <a:buNone/>
+            </a:pPr>
+            <a:r>
+              <a:rPr lang="en-GB" sz="1100" b="0" i="0" dirty="0">
+                <a:solidFill>
+                  <a:srgbClr val="000000"/>
+                </a:solidFill>
+                <a:effectLst/>
+                <a:latin typeface="Calibri" panose="020F0502020204030204" pitchFamily="34" charset="0"/>
+                <a:ea typeface="Calibri" panose="020F0502020204030204" pitchFamily="34" charset="0"/>
+                <a:cs typeface="Calibri" panose="020F0502020204030204" pitchFamily="34" charset="0"/>
+              </a:rPr>
+              <a:t>Lorem ipsum </a:t>
+            </a:r>
+            <a:r>
+              <a:rPr lang="en-GB" sz="1100" b="0" i="0" dirty="0" err="1">
+                <a:solidFill>
+                  <a:srgbClr val="000000"/>
+                </a:solidFill>
+                <a:effectLst/>
+                <a:latin typeface="Calibri" panose="020F0502020204030204" pitchFamily="34" charset="0"/>
+                <a:ea typeface="Calibri" panose="020F0502020204030204" pitchFamily="34" charset="0"/>
+                <a:cs typeface="Calibri" panose="020F0502020204030204" pitchFamily="34" charset="0"/>
+              </a:rPr>
+              <a:t>dolor</a:t>
+            </a:r>
+            <a:r>
+              <a:rPr lang="en-GB" sz="1100" b="0" i="0" dirty="0">
+                <a:solidFill>
+                  <a:srgbClr val="000000"/>
+                </a:solidFill>
+                <a:effectLst/>
+                <a:latin typeface="Calibri" panose="020F0502020204030204" pitchFamily="34" charset="0"/>
+                <a:ea typeface="Calibri" panose="020F0502020204030204" pitchFamily="34" charset="0"/>
+                <a:cs typeface="Calibri" panose="020F0502020204030204" pitchFamily="34" charset="0"/>
+              </a:rPr>
+              <a:t> sit </a:t>
+            </a:r>
+            <a:r>
+              <a:rPr lang="en-GB" sz="1100" b="0" i="0" dirty="0" err="1">
+                <a:solidFill>
+                  <a:srgbClr val="000000"/>
+                </a:solidFill>
+                <a:effectLst/>
+                <a:latin typeface="Calibri" panose="020F0502020204030204" pitchFamily="34" charset="0"/>
+                <a:ea typeface="Calibri" panose="020F0502020204030204" pitchFamily="34" charset="0"/>
+                <a:cs typeface="Calibri" panose="020F0502020204030204" pitchFamily="34" charset="0"/>
+              </a:rPr>
+              <a:t>amet</a:t>
+            </a:r>
+            <a:endParaRPr lang="en-GB" sz="1100" b="0" i="0" dirty="0">
+              <a:solidFill>
+                <a:srgbClr val="000000"/>
+              </a:solidFill>
+              <a:effectLst/>
+              <a:latin typeface="Calibri" panose="020F0502020204030204" pitchFamily="34" charset="0"/>
+              <a:ea typeface="Calibri" panose="020F0502020204030204" pitchFamily="34" charset="0"/>
+              <a:cs typeface="Calibri" panose="020F0502020204030204" pitchFamily="34" charset="0"/>
+            </a:endParaRPr>
+          </a:p>
+          <a:p>
+            <a:pPr marL="0" indent="0">
+              <a:buNone/>
+            </a:pPr>
+            <a:endParaRPr lang="en-GB" sz="2400" dirty="0"/>
           </a:p>
         </p:txBody>
       </p:sp>
     </p:spTree>
     <p:extLst>
       <p:ext uri="{BB962C8B-B14F-4D97-AF65-F5344CB8AC3E}">
-        <p14:creationId xmlns:p14="http://schemas.microsoft.com/office/powerpoint/2010/main" val="2229995131"/>
+        <p14:creationId xmlns:p14="http://schemas.microsoft.com/office/powerpoint/2010/main" val="1050177963"/>
+      </p:ext>
+    </p:extLst>
+  </p:cSld>
+  <p:clrMapOvr>
+    <a:masterClrMapping/>
+  </p:clrMapOvr>
+</p:sld>
+</file>
+
+<file path=ppt/slides/slide11.xml><?xml version="1.0" encoding="utf-8"?>
+<p:sld xmlns:a="http://schemas.openxmlformats.org/drawingml/2006/main" xmlns:r="http://schemas.openxmlformats.org/officeDocument/2006/relationships" xmlns:p="http://schemas.openxmlformats.org/presentationml/2006/main">
+  <p:cSld>
+    <p:spTree>
+      <p:nvGrpSpPr>
+        <p:cNvPr id="1" name=""/>
+        <p:cNvGrpSpPr/>
+        <p:nvPr/>
+      </p:nvGrpSpPr>
+      <p:grpSpPr>
+        <a:xfrm>
+          <a:off x="0" y="0"/>
+          <a:ext cx="0" cy="0"/>
+          <a:chOff x="0" y="0"/>
+          <a:chExt cx="0" cy="0"/>
+        </a:xfrm>
+      </p:grpSpPr>
+      <p:sp>
+        <p:nvSpPr>
+          <p:cNvPr id="2" name="Title 1">
+            <a:extLst>
+              <a:ext uri="{FF2B5EF4-FFF2-40B4-BE49-F238E27FC236}">
+                <a16:creationId xmlns:a16="http://schemas.microsoft.com/office/drawing/2014/main" id="{539AB629-3A8A-B7D8-20E4-F862884889D9}"/>
+              </a:ext>
+            </a:extLst>
+          </p:cNvPr>
+          <p:cNvSpPr>
+            <a:spLocks noGrp="1"/>
+          </p:cNvSpPr>
+          <p:nvPr>
+            <p:ph type="title"/>
+          </p:nvPr>
+        </p:nvSpPr>
+        <p:spPr/>
+        <p:txBody>
+          <a:bodyPr/>
+          <a:lstStyle/>
+          <a:p>
+            <a:r>
+              <a:rPr lang="en-GB" dirty="0">
+                <a:latin typeface="Gadugi" panose="020B0502040204020203" pitchFamily="34" charset="0"/>
+                <a:ea typeface="Gadugi" panose="020B0502040204020203" pitchFamily="34" charset="0"/>
+              </a:rPr>
+              <a:t>Gadugi</a:t>
+            </a:r>
+          </a:p>
+        </p:txBody>
+      </p:sp>
+      <p:sp>
+        <p:nvSpPr>
+          <p:cNvPr id="3" name="Content Placeholder 2">
+            <a:extLst>
+              <a:ext uri="{FF2B5EF4-FFF2-40B4-BE49-F238E27FC236}">
+                <a16:creationId xmlns:a16="http://schemas.microsoft.com/office/drawing/2014/main" id="{4780F379-B09C-400A-9F37-5C5D832281D5}"/>
+              </a:ext>
+            </a:extLst>
+          </p:cNvPr>
+          <p:cNvSpPr>
+            <a:spLocks noGrp="1"/>
+          </p:cNvSpPr>
+          <p:nvPr>
+            <p:ph idx="1"/>
+          </p:nvPr>
+        </p:nvSpPr>
+        <p:spPr/>
+        <p:txBody>
+          <a:bodyPr/>
+          <a:lstStyle/>
+          <a:p>
+            <a:pPr marL="0" indent="0">
+              <a:buNone/>
+            </a:pPr>
+            <a:r>
+              <a:rPr lang="en-GB" sz="3200" b="0" i="0" dirty="0">
+                <a:solidFill>
+                  <a:srgbClr val="000000"/>
+                </a:solidFill>
+                <a:effectLst/>
+                <a:latin typeface="Gadugi" panose="020B0502040204020203" pitchFamily="34" charset="0"/>
+                <a:ea typeface="Gadugi" panose="020B0502040204020203" pitchFamily="34" charset="0"/>
+                <a:cs typeface="Calibri" panose="020F0502020204030204" pitchFamily="34" charset="0"/>
+              </a:rPr>
+              <a:t>Lorem ipsum </a:t>
+            </a:r>
+            <a:r>
+              <a:rPr lang="en-GB" sz="3200" b="0" i="0" dirty="0" err="1">
+                <a:solidFill>
+                  <a:srgbClr val="000000"/>
+                </a:solidFill>
+                <a:effectLst/>
+                <a:latin typeface="Gadugi" panose="020B0502040204020203" pitchFamily="34" charset="0"/>
+                <a:ea typeface="Gadugi" panose="020B0502040204020203" pitchFamily="34" charset="0"/>
+                <a:cs typeface="Calibri" panose="020F0502020204030204" pitchFamily="34" charset="0"/>
+              </a:rPr>
+              <a:t>dolor</a:t>
+            </a:r>
+            <a:r>
+              <a:rPr lang="en-GB" sz="3200" b="0" i="0" dirty="0">
+                <a:solidFill>
+                  <a:srgbClr val="000000"/>
+                </a:solidFill>
+                <a:effectLst/>
+                <a:latin typeface="Gadugi" panose="020B0502040204020203" pitchFamily="34" charset="0"/>
+                <a:ea typeface="Gadugi" panose="020B0502040204020203" pitchFamily="34" charset="0"/>
+                <a:cs typeface="Calibri" panose="020F0502020204030204" pitchFamily="34" charset="0"/>
+              </a:rPr>
+              <a:t> sit </a:t>
+            </a:r>
+            <a:r>
+              <a:rPr lang="en-GB" sz="3200" b="0" i="0" dirty="0" err="1">
+                <a:solidFill>
+                  <a:srgbClr val="000000"/>
+                </a:solidFill>
+                <a:effectLst/>
+                <a:latin typeface="Gadugi" panose="020B0502040204020203" pitchFamily="34" charset="0"/>
+                <a:ea typeface="Gadugi" panose="020B0502040204020203" pitchFamily="34" charset="0"/>
+                <a:cs typeface="Calibri" panose="020F0502020204030204" pitchFamily="34" charset="0"/>
+              </a:rPr>
+              <a:t>amet</a:t>
+            </a:r>
+            <a:endParaRPr lang="en-GB" sz="3200" b="0" i="0" dirty="0">
+              <a:solidFill>
+                <a:srgbClr val="000000"/>
+              </a:solidFill>
+              <a:effectLst/>
+              <a:latin typeface="Gadugi" panose="020B0502040204020203" pitchFamily="34" charset="0"/>
+              <a:ea typeface="Gadugi" panose="020B0502040204020203" pitchFamily="34" charset="0"/>
+              <a:cs typeface="Calibri" panose="020F0502020204030204" pitchFamily="34" charset="0"/>
+            </a:endParaRPr>
+          </a:p>
+          <a:p>
+            <a:pPr marL="0" indent="0">
+              <a:buNone/>
+            </a:pPr>
+            <a:r>
+              <a:rPr lang="en-GB" sz="2400" b="0" i="0" dirty="0">
+                <a:solidFill>
+                  <a:srgbClr val="000000"/>
+                </a:solidFill>
+                <a:effectLst/>
+                <a:latin typeface="Gadugi" panose="020B0502040204020203" pitchFamily="34" charset="0"/>
+                <a:ea typeface="Gadugi" panose="020B0502040204020203" pitchFamily="34" charset="0"/>
+                <a:cs typeface="Calibri" panose="020F0502020204030204" pitchFamily="34" charset="0"/>
+              </a:rPr>
+              <a:t>Lorem ipsum </a:t>
+            </a:r>
+            <a:r>
+              <a:rPr lang="en-GB" sz="2400" b="0" i="0" dirty="0" err="1">
+                <a:solidFill>
+                  <a:srgbClr val="000000"/>
+                </a:solidFill>
+                <a:effectLst/>
+                <a:latin typeface="Gadugi" panose="020B0502040204020203" pitchFamily="34" charset="0"/>
+                <a:ea typeface="Gadugi" panose="020B0502040204020203" pitchFamily="34" charset="0"/>
+                <a:cs typeface="Calibri" panose="020F0502020204030204" pitchFamily="34" charset="0"/>
+              </a:rPr>
+              <a:t>dolor</a:t>
+            </a:r>
+            <a:r>
+              <a:rPr lang="en-GB" sz="2400" b="0" i="0" dirty="0">
+                <a:solidFill>
+                  <a:srgbClr val="000000"/>
+                </a:solidFill>
+                <a:effectLst/>
+                <a:latin typeface="Gadugi" panose="020B0502040204020203" pitchFamily="34" charset="0"/>
+                <a:ea typeface="Gadugi" panose="020B0502040204020203" pitchFamily="34" charset="0"/>
+                <a:cs typeface="Calibri" panose="020F0502020204030204" pitchFamily="34" charset="0"/>
+              </a:rPr>
+              <a:t> sit </a:t>
+            </a:r>
+            <a:r>
+              <a:rPr lang="en-GB" sz="2400" b="0" i="0" dirty="0" err="1">
+                <a:solidFill>
+                  <a:srgbClr val="000000"/>
+                </a:solidFill>
+                <a:effectLst/>
+                <a:latin typeface="Gadugi" panose="020B0502040204020203" pitchFamily="34" charset="0"/>
+                <a:ea typeface="Gadugi" panose="020B0502040204020203" pitchFamily="34" charset="0"/>
+                <a:cs typeface="Calibri" panose="020F0502020204030204" pitchFamily="34" charset="0"/>
+              </a:rPr>
+              <a:t>amet</a:t>
+            </a:r>
+            <a:endParaRPr lang="en-GB" sz="2400" b="0" i="0" dirty="0">
+              <a:solidFill>
+                <a:srgbClr val="000000"/>
+              </a:solidFill>
+              <a:effectLst/>
+              <a:latin typeface="Gadugi" panose="020B0502040204020203" pitchFamily="34" charset="0"/>
+              <a:ea typeface="Gadugi" panose="020B0502040204020203" pitchFamily="34" charset="0"/>
+              <a:cs typeface="Calibri" panose="020F0502020204030204" pitchFamily="34" charset="0"/>
+            </a:endParaRPr>
+          </a:p>
+          <a:p>
+            <a:pPr marL="0" indent="0">
+              <a:buNone/>
+            </a:pPr>
+            <a:r>
+              <a:rPr lang="en-GB" sz="2000" b="0" i="0" dirty="0">
+                <a:solidFill>
+                  <a:srgbClr val="000000"/>
+                </a:solidFill>
+                <a:effectLst/>
+                <a:latin typeface="Gadugi" panose="020B0502040204020203" pitchFamily="34" charset="0"/>
+                <a:ea typeface="Gadugi" panose="020B0502040204020203" pitchFamily="34" charset="0"/>
+                <a:cs typeface="Calibri" panose="020F0502020204030204" pitchFamily="34" charset="0"/>
+              </a:rPr>
+              <a:t>Lorem ipsum </a:t>
+            </a:r>
+            <a:r>
+              <a:rPr lang="en-GB" sz="2000" b="0" i="0" dirty="0" err="1">
+                <a:solidFill>
+                  <a:srgbClr val="000000"/>
+                </a:solidFill>
+                <a:effectLst/>
+                <a:latin typeface="Gadugi" panose="020B0502040204020203" pitchFamily="34" charset="0"/>
+                <a:ea typeface="Gadugi" panose="020B0502040204020203" pitchFamily="34" charset="0"/>
+                <a:cs typeface="Calibri" panose="020F0502020204030204" pitchFamily="34" charset="0"/>
+              </a:rPr>
+              <a:t>dolor</a:t>
+            </a:r>
+            <a:r>
+              <a:rPr lang="en-GB" sz="2000" b="0" i="0" dirty="0">
+                <a:solidFill>
+                  <a:srgbClr val="000000"/>
+                </a:solidFill>
+                <a:effectLst/>
+                <a:latin typeface="Gadugi" panose="020B0502040204020203" pitchFamily="34" charset="0"/>
+                <a:ea typeface="Gadugi" panose="020B0502040204020203" pitchFamily="34" charset="0"/>
+                <a:cs typeface="Calibri" panose="020F0502020204030204" pitchFamily="34" charset="0"/>
+              </a:rPr>
+              <a:t> sit </a:t>
+            </a:r>
+            <a:r>
+              <a:rPr lang="en-GB" sz="2000" b="0" i="0" dirty="0" err="1">
+                <a:solidFill>
+                  <a:srgbClr val="000000"/>
+                </a:solidFill>
+                <a:effectLst/>
+                <a:latin typeface="Gadugi" panose="020B0502040204020203" pitchFamily="34" charset="0"/>
+                <a:ea typeface="Gadugi" panose="020B0502040204020203" pitchFamily="34" charset="0"/>
+                <a:cs typeface="Calibri" panose="020F0502020204030204" pitchFamily="34" charset="0"/>
+              </a:rPr>
+              <a:t>amet</a:t>
+            </a:r>
+            <a:endParaRPr lang="en-GB" sz="2000" dirty="0">
+              <a:solidFill>
+                <a:srgbClr val="000000"/>
+              </a:solidFill>
+              <a:latin typeface="Gadugi" panose="020B0502040204020203" pitchFamily="34" charset="0"/>
+              <a:ea typeface="Gadugi" panose="020B0502040204020203" pitchFamily="34" charset="0"/>
+              <a:cs typeface="Calibri" panose="020F0502020204030204" pitchFamily="34" charset="0"/>
+            </a:endParaRPr>
+          </a:p>
+          <a:p>
+            <a:pPr marL="0" indent="0">
+              <a:buNone/>
+            </a:pPr>
+            <a:r>
+              <a:rPr lang="en-GB" sz="1600" b="0" i="0" dirty="0">
+                <a:solidFill>
+                  <a:srgbClr val="000000"/>
+                </a:solidFill>
+                <a:effectLst/>
+                <a:latin typeface="Gadugi" panose="020B0502040204020203" pitchFamily="34" charset="0"/>
+                <a:ea typeface="Gadugi" panose="020B0502040204020203" pitchFamily="34" charset="0"/>
+                <a:cs typeface="Calibri" panose="020F0502020204030204" pitchFamily="34" charset="0"/>
+              </a:rPr>
+              <a:t>Lorem ipsum </a:t>
+            </a:r>
+            <a:r>
+              <a:rPr lang="en-GB" sz="1600" b="0" i="0" dirty="0" err="1">
+                <a:solidFill>
+                  <a:srgbClr val="000000"/>
+                </a:solidFill>
+                <a:effectLst/>
+                <a:latin typeface="Gadugi" panose="020B0502040204020203" pitchFamily="34" charset="0"/>
+                <a:ea typeface="Gadugi" panose="020B0502040204020203" pitchFamily="34" charset="0"/>
+                <a:cs typeface="Calibri" panose="020F0502020204030204" pitchFamily="34" charset="0"/>
+              </a:rPr>
+              <a:t>dolor</a:t>
+            </a:r>
+            <a:r>
+              <a:rPr lang="en-GB" sz="1600" b="0" i="0" dirty="0">
+                <a:solidFill>
+                  <a:srgbClr val="000000"/>
+                </a:solidFill>
+                <a:effectLst/>
+                <a:latin typeface="Gadugi" panose="020B0502040204020203" pitchFamily="34" charset="0"/>
+                <a:ea typeface="Gadugi" panose="020B0502040204020203" pitchFamily="34" charset="0"/>
+                <a:cs typeface="Calibri" panose="020F0502020204030204" pitchFamily="34" charset="0"/>
+              </a:rPr>
+              <a:t> sit </a:t>
+            </a:r>
+            <a:r>
+              <a:rPr lang="en-GB" sz="1600" b="0" i="0" dirty="0" err="1">
+                <a:solidFill>
+                  <a:srgbClr val="000000"/>
+                </a:solidFill>
+                <a:effectLst/>
+                <a:latin typeface="Gadugi" panose="020B0502040204020203" pitchFamily="34" charset="0"/>
+                <a:ea typeface="Gadugi" panose="020B0502040204020203" pitchFamily="34" charset="0"/>
+                <a:cs typeface="Calibri" panose="020F0502020204030204" pitchFamily="34" charset="0"/>
+              </a:rPr>
+              <a:t>amet</a:t>
+            </a:r>
+            <a:endParaRPr lang="en-GB" sz="1600" dirty="0">
+              <a:latin typeface="Gadugi" panose="020B0502040204020203" pitchFamily="34" charset="0"/>
+              <a:ea typeface="Gadugi" panose="020B0502040204020203" pitchFamily="34" charset="0"/>
+              <a:cs typeface="Calibri" panose="020F0502020204030204" pitchFamily="34" charset="0"/>
+            </a:endParaRPr>
+          </a:p>
+          <a:p>
+            <a:pPr marL="0" indent="0">
+              <a:buNone/>
+            </a:pPr>
+            <a:r>
+              <a:rPr lang="en-GB" sz="1100" b="0" i="0" dirty="0">
+                <a:solidFill>
+                  <a:srgbClr val="000000"/>
+                </a:solidFill>
+                <a:effectLst/>
+                <a:latin typeface="Gadugi" panose="020B0502040204020203" pitchFamily="34" charset="0"/>
+                <a:ea typeface="Gadugi" panose="020B0502040204020203" pitchFamily="34" charset="0"/>
+                <a:cs typeface="Calibri" panose="020F0502020204030204" pitchFamily="34" charset="0"/>
+              </a:rPr>
+              <a:t>Lorem ipsum </a:t>
+            </a:r>
+            <a:r>
+              <a:rPr lang="en-GB" sz="1100" b="0" i="0" dirty="0" err="1">
+                <a:solidFill>
+                  <a:srgbClr val="000000"/>
+                </a:solidFill>
+                <a:effectLst/>
+                <a:latin typeface="Gadugi" panose="020B0502040204020203" pitchFamily="34" charset="0"/>
+                <a:ea typeface="Gadugi" panose="020B0502040204020203" pitchFamily="34" charset="0"/>
+                <a:cs typeface="Calibri" panose="020F0502020204030204" pitchFamily="34" charset="0"/>
+              </a:rPr>
+              <a:t>dolor</a:t>
+            </a:r>
+            <a:r>
+              <a:rPr lang="en-GB" sz="1100" b="0" i="0" dirty="0">
+                <a:solidFill>
+                  <a:srgbClr val="000000"/>
+                </a:solidFill>
+                <a:effectLst/>
+                <a:latin typeface="Gadugi" panose="020B0502040204020203" pitchFamily="34" charset="0"/>
+                <a:ea typeface="Gadugi" panose="020B0502040204020203" pitchFamily="34" charset="0"/>
+                <a:cs typeface="Calibri" panose="020F0502020204030204" pitchFamily="34" charset="0"/>
+              </a:rPr>
+              <a:t> sit </a:t>
+            </a:r>
+            <a:r>
+              <a:rPr lang="en-GB" sz="1100" b="0" i="0" dirty="0" err="1">
+                <a:solidFill>
+                  <a:srgbClr val="000000"/>
+                </a:solidFill>
+                <a:effectLst/>
+                <a:latin typeface="Gadugi" panose="020B0502040204020203" pitchFamily="34" charset="0"/>
+                <a:ea typeface="Gadugi" panose="020B0502040204020203" pitchFamily="34" charset="0"/>
+                <a:cs typeface="Calibri" panose="020F0502020204030204" pitchFamily="34" charset="0"/>
+              </a:rPr>
+              <a:t>amet</a:t>
+            </a:r>
+            <a:endParaRPr lang="en-GB" sz="1100" b="0" i="0" dirty="0">
+              <a:solidFill>
+                <a:srgbClr val="000000"/>
+              </a:solidFill>
+              <a:effectLst/>
+              <a:latin typeface="Gadugi" panose="020B0502040204020203" pitchFamily="34" charset="0"/>
+              <a:ea typeface="Gadugi" panose="020B0502040204020203" pitchFamily="34" charset="0"/>
+              <a:cs typeface="Calibri" panose="020F0502020204030204" pitchFamily="34" charset="0"/>
+            </a:endParaRPr>
+          </a:p>
+          <a:p>
+            <a:pPr marL="0" indent="0">
+              <a:buNone/>
+            </a:pPr>
+            <a:endParaRPr lang="en-GB" sz="2400" dirty="0"/>
+          </a:p>
+        </p:txBody>
+      </p:sp>
+    </p:spTree>
+    <p:extLst>
+      <p:ext uri="{BB962C8B-B14F-4D97-AF65-F5344CB8AC3E}">
+        <p14:creationId xmlns:p14="http://schemas.microsoft.com/office/powerpoint/2010/main" val="2281088083"/>
+      </p:ext>
+    </p:extLst>
+  </p:cSld>
+  <p:clrMapOvr>
+    <a:masterClrMapping/>
+  </p:clrMapOvr>
+</p:sld>
+</file>
+
+<file path=ppt/slides/slide12.xml><?xml version="1.0" encoding="utf-8"?>
+<p:sld xmlns:a="http://schemas.openxmlformats.org/drawingml/2006/main" xmlns:r="http://schemas.openxmlformats.org/officeDocument/2006/relationships" xmlns:p="http://schemas.openxmlformats.org/presentationml/2006/main">
+  <p:cSld>
+    <p:spTree>
+      <p:nvGrpSpPr>
+        <p:cNvPr id="1" name=""/>
+        <p:cNvGrpSpPr/>
+        <p:nvPr/>
+      </p:nvGrpSpPr>
+      <p:grpSpPr>
+        <a:xfrm>
+          <a:off x="0" y="0"/>
+          <a:ext cx="0" cy="0"/>
+          <a:chOff x="0" y="0"/>
+          <a:chExt cx="0" cy="0"/>
+        </a:xfrm>
+      </p:grpSpPr>
+      <p:sp>
+        <p:nvSpPr>
+          <p:cNvPr id="2" name="Title 1">
+            <a:extLst>
+              <a:ext uri="{FF2B5EF4-FFF2-40B4-BE49-F238E27FC236}">
+                <a16:creationId xmlns:a16="http://schemas.microsoft.com/office/drawing/2014/main" id="{539AB629-3A8A-B7D8-20E4-F862884889D9}"/>
+              </a:ext>
+            </a:extLst>
+          </p:cNvPr>
+          <p:cNvSpPr>
+            <a:spLocks noGrp="1"/>
+          </p:cNvSpPr>
+          <p:nvPr>
+            <p:ph type="title"/>
+          </p:nvPr>
+        </p:nvSpPr>
+        <p:spPr/>
+        <p:txBody>
+          <a:bodyPr/>
+          <a:lstStyle/>
+          <a:p>
+            <a:r>
+              <a:rPr lang="en-GB" dirty="0">
+                <a:latin typeface="Mid Century Sans" panose="020B0504020202020203" pitchFamily="34" charset="0"/>
+                <a:ea typeface="Gadugi" panose="020B0502040204020203" pitchFamily="34" charset="0"/>
+              </a:rPr>
+              <a:t>Mid Century Sans</a:t>
+            </a:r>
+          </a:p>
+        </p:txBody>
+      </p:sp>
+      <p:sp>
+        <p:nvSpPr>
+          <p:cNvPr id="3" name="Content Placeholder 2">
+            <a:extLst>
+              <a:ext uri="{FF2B5EF4-FFF2-40B4-BE49-F238E27FC236}">
+                <a16:creationId xmlns:a16="http://schemas.microsoft.com/office/drawing/2014/main" id="{4780F379-B09C-400A-9F37-5C5D832281D5}"/>
+              </a:ext>
+            </a:extLst>
+          </p:cNvPr>
+          <p:cNvSpPr>
+            <a:spLocks noGrp="1"/>
+          </p:cNvSpPr>
+          <p:nvPr>
+            <p:ph idx="1"/>
+          </p:nvPr>
+        </p:nvSpPr>
+        <p:spPr/>
+        <p:txBody>
+          <a:bodyPr/>
+          <a:lstStyle/>
+          <a:p>
+            <a:pPr marL="0" indent="0">
+              <a:buNone/>
+            </a:pPr>
+            <a:r>
+              <a:rPr lang="en-GB" sz="3200" b="0" i="0" dirty="0">
+                <a:solidFill>
+                  <a:srgbClr val="000000"/>
+                </a:solidFill>
+                <a:effectLst/>
+                <a:latin typeface="Mid Century Sans" panose="020B0504020202020203" pitchFamily="34" charset="0"/>
+                <a:ea typeface="Gadugi" panose="020B0502040204020203" pitchFamily="34" charset="0"/>
+                <a:cs typeface="Calibri" panose="020F0502020204030204" pitchFamily="34" charset="0"/>
+              </a:rPr>
+              <a:t>Lorem ipsum </a:t>
+            </a:r>
+            <a:r>
+              <a:rPr lang="en-GB" sz="3200" b="0" i="0" dirty="0" err="1">
+                <a:solidFill>
+                  <a:srgbClr val="000000"/>
+                </a:solidFill>
+                <a:effectLst/>
+                <a:latin typeface="Mid Century Sans" panose="020B0504020202020203" pitchFamily="34" charset="0"/>
+                <a:ea typeface="Gadugi" panose="020B0502040204020203" pitchFamily="34" charset="0"/>
+                <a:cs typeface="Calibri" panose="020F0502020204030204" pitchFamily="34" charset="0"/>
+              </a:rPr>
+              <a:t>dolor</a:t>
+            </a:r>
+            <a:r>
+              <a:rPr lang="en-GB" sz="3200" b="0" i="0" dirty="0">
+                <a:solidFill>
+                  <a:srgbClr val="000000"/>
+                </a:solidFill>
+                <a:effectLst/>
+                <a:latin typeface="Mid Century Sans" panose="020B0504020202020203" pitchFamily="34" charset="0"/>
+                <a:ea typeface="Gadugi" panose="020B0502040204020203" pitchFamily="34" charset="0"/>
+                <a:cs typeface="Calibri" panose="020F0502020204030204" pitchFamily="34" charset="0"/>
+              </a:rPr>
+              <a:t> sit </a:t>
+            </a:r>
+            <a:r>
+              <a:rPr lang="en-GB" sz="3200" b="0" i="0" dirty="0" err="1">
+                <a:solidFill>
+                  <a:srgbClr val="000000"/>
+                </a:solidFill>
+                <a:effectLst/>
+                <a:latin typeface="Mid Century Sans" panose="020B0504020202020203" pitchFamily="34" charset="0"/>
+                <a:ea typeface="Gadugi" panose="020B0502040204020203" pitchFamily="34" charset="0"/>
+                <a:cs typeface="Calibri" panose="020F0502020204030204" pitchFamily="34" charset="0"/>
+              </a:rPr>
+              <a:t>amet</a:t>
+            </a:r>
+            <a:endParaRPr lang="en-GB" sz="3200" b="0" i="0" dirty="0">
+              <a:solidFill>
+                <a:srgbClr val="000000"/>
+              </a:solidFill>
+              <a:effectLst/>
+              <a:latin typeface="Mid Century Sans" panose="020B0504020202020203" pitchFamily="34" charset="0"/>
+              <a:ea typeface="Gadugi" panose="020B0502040204020203" pitchFamily="34" charset="0"/>
+              <a:cs typeface="Calibri" panose="020F0502020204030204" pitchFamily="34" charset="0"/>
+            </a:endParaRPr>
+          </a:p>
+          <a:p>
+            <a:pPr marL="0" indent="0">
+              <a:buNone/>
+            </a:pPr>
+            <a:r>
+              <a:rPr lang="en-GB" sz="2400" b="0" i="0" dirty="0">
+                <a:solidFill>
+                  <a:srgbClr val="000000"/>
+                </a:solidFill>
+                <a:effectLst/>
+                <a:latin typeface="Mid Century Sans" panose="020B0504020202020203" pitchFamily="34" charset="0"/>
+                <a:ea typeface="Gadugi" panose="020B0502040204020203" pitchFamily="34" charset="0"/>
+                <a:cs typeface="Calibri" panose="020F0502020204030204" pitchFamily="34" charset="0"/>
+              </a:rPr>
+              <a:t>Lorem ipsum </a:t>
+            </a:r>
+            <a:r>
+              <a:rPr lang="en-GB" sz="2400" b="0" i="0" dirty="0" err="1">
+                <a:solidFill>
+                  <a:srgbClr val="000000"/>
+                </a:solidFill>
+                <a:effectLst/>
+                <a:latin typeface="Mid Century Sans" panose="020B0504020202020203" pitchFamily="34" charset="0"/>
+                <a:ea typeface="Gadugi" panose="020B0502040204020203" pitchFamily="34" charset="0"/>
+                <a:cs typeface="Calibri" panose="020F0502020204030204" pitchFamily="34" charset="0"/>
+              </a:rPr>
+              <a:t>dolor</a:t>
+            </a:r>
+            <a:r>
+              <a:rPr lang="en-GB" sz="2400" b="0" i="0" dirty="0">
+                <a:solidFill>
+                  <a:srgbClr val="000000"/>
+                </a:solidFill>
+                <a:effectLst/>
+                <a:latin typeface="Mid Century Sans" panose="020B0504020202020203" pitchFamily="34" charset="0"/>
+                <a:ea typeface="Gadugi" panose="020B0502040204020203" pitchFamily="34" charset="0"/>
+                <a:cs typeface="Calibri" panose="020F0502020204030204" pitchFamily="34" charset="0"/>
+              </a:rPr>
+              <a:t> sit </a:t>
+            </a:r>
+            <a:r>
+              <a:rPr lang="en-GB" sz="2400" b="0" i="0" dirty="0" err="1">
+                <a:solidFill>
+                  <a:srgbClr val="000000"/>
+                </a:solidFill>
+                <a:effectLst/>
+                <a:latin typeface="Mid Century Sans" panose="020B0504020202020203" pitchFamily="34" charset="0"/>
+                <a:ea typeface="Gadugi" panose="020B0502040204020203" pitchFamily="34" charset="0"/>
+                <a:cs typeface="Calibri" panose="020F0502020204030204" pitchFamily="34" charset="0"/>
+              </a:rPr>
+              <a:t>amet</a:t>
+            </a:r>
+            <a:endParaRPr lang="en-GB" sz="2400" b="0" i="0" dirty="0">
+              <a:solidFill>
+                <a:srgbClr val="000000"/>
+              </a:solidFill>
+              <a:effectLst/>
+              <a:latin typeface="Mid Century Sans" panose="020B0504020202020203" pitchFamily="34" charset="0"/>
+              <a:ea typeface="Gadugi" panose="020B0502040204020203" pitchFamily="34" charset="0"/>
+              <a:cs typeface="Calibri" panose="020F0502020204030204" pitchFamily="34" charset="0"/>
+            </a:endParaRPr>
+          </a:p>
+          <a:p>
+            <a:pPr marL="0" indent="0">
+              <a:buNone/>
+            </a:pPr>
+            <a:r>
+              <a:rPr lang="en-GB" sz="2000" b="0" i="0" dirty="0">
+                <a:solidFill>
+                  <a:srgbClr val="000000"/>
+                </a:solidFill>
+                <a:effectLst/>
+                <a:latin typeface="Mid Century Sans" panose="020B0504020202020203" pitchFamily="34" charset="0"/>
+                <a:ea typeface="Gadugi" panose="020B0502040204020203" pitchFamily="34" charset="0"/>
+                <a:cs typeface="Calibri" panose="020F0502020204030204" pitchFamily="34" charset="0"/>
+              </a:rPr>
+              <a:t>Lorem ipsum </a:t>
+            </a:r>
+            <a:r>
+              <a:rPr lang="en-GB" sz="2000" b="0" i="0" dirty="0" err="1">
+                <a:solidFill>
+                  <a:srgbClr val="000000"/>
+                </a:solidFill>
+                <a:effectLst/>
+                <a:latin typeface="Mid Century Sans" panose="020B0504020202020203" pitchFamily="34" charset="0"/>
+                <a:ea typeface="Gadugi" panose="020B0502040204020203" pitchFamily="34" charset="0"/>
+                <a:cs typeface="Calibri" panose="020F0502020204030204" pitchFamily="34" charset="0"/>
+              </a:rPr>
+              <a:t>dolor</a:t>
+            </a:r>
+            <a:r>
+              <a:rPr lang="en-GB" sz="2000" b="0" i="0" dirty="0">
+                <a:solidFill>
+                  <a:srgbClr val="000000"/>
+                </a:solidFill>
+                <a:effectLst/>
+                <a:latin typeface="Mid Century Sans" panose="020B0504020202020203" pitchFamily="34" charset="0"/>
+                <a:ea typeface="Gadugi" panose="020B0502040204020203" pitchFamily="34" charset="0"/>
+                <a:cs typeface="Calibri" panose="020F0502020204030204" pitchFamily="34" charset="0"/>
+              </a:rPr>
+              <a:t> sit </a:t>
+            </a:r>
+            <a:r>
+              <a:rPr lang="en-GB" sz="2000" b="0" i="0" dirty="0" err="1">
+                <a:solidFill>
+                  <a:srgbClr val="000000"/>
+                </a:solidFill>
+                <a:effectLst/>
+                <a:latin typeface="Mid Century Sans" panose="020B0504020202020203" pitchFamily="34" charset="0"/>
+                <a:ea typeface="Gadugi" panose="020B0502040204020203" pitchFamily="34" charset="0"/>
+                <a:cs typeface="Calibri" panose="020F0502020204030204" pitchFamily="34" charset="0"/>
+              </a:rPr>
+              <a:t>amet</a:t>
+            </a:r>
+            <a:endParaRPr lang="en-GB" sz="2000" dirty="0">
+              <a:solidFill>
+                <a:srgbClr val="000000"/>
+              </a:solidFill>
+              <a:latin typeface="Mid Century Sans" panose="020B0504020202020203" pitchFamily="34" charset="0"/>
+              <a:ea typeface="Gadugi" panose="020B0502040204020203" pitchFamily="34" charset="0"/>
+              <a:cs typeface="Calibri" panose="020F0502020204030204" pitchFamily="34" charset="0"/>
+            </a:endParaRPr>
+          </a:p>
+          <a:p>
+            <a:pPr marL="0" indent="0">
+              <a:buNone/>
+            </a:pPr>
+            <a:r>
+              <a:rPr lang="en-GB" sz="1600" b="0" i="0" dirty="0">
+                <a:solidFill>
+                  <a:srgbClr val="000000"/>
+                </a:solidFill>
+                <a:effectLst/>
+                <a:latin typeface="Mid Century Sans" panose="020B0504020202020203" pitchFamily="34" charset="0"/>
+                <a:ea typeface="Gadugi" panose="020B0502040204020203" pitchFamily="34" charset="0"/>
+                <a:cs typeface="Calibri" panose="020F0502020204030204" pitchFamily="34" charset="0"/>
+              </a:rPr>
+              <a:t>Lorem ipsum </a:t>
+            </a:r>
+            <a:r>
+              <a:rPr lang="en-GB" sz="1600" b="0" i="0" dirty="0" err="1">
+                <a:solidFill>
+                  <a:srgbClr val="000000"/>
+                </a:solidFill>
+                <a:effectLst/>
+                <a:latin typeface="Mid Century Sans" panose="020B0504020202020203" pitchFamily="34" charset="0"/>
+                <a:ea typeface="Gadugi" panose="020B0502040204020203" pitchFamily="34" charset="0"/>
+                <a:cs typeface="Calibri" panose="020F0502020204030204" pitchFamily="34" charset="0"/>
+              </a:rPr>
+              <a:t>dolor</a:t>
+            </a:r>
+            <a:r>
+              <a:rPr lang="en-GB" sz="1600" b="0" i="0" dirty="0">
+                <a:solidFill>
+                  <a:srgbClr val="000000"/>
+                </a:solidFill>
+                <a:effectLst/>
+                <a:latin typeface="Mid Century Sans" panose="020B0504020202020203" pitchFamily="34" charset="0"/>
+                <a:ea typeface="Gadugi" panose="020B0502040204020203" pitchFamily="34" charset="0"/>
+                <a:cs typeface="Calibri" panose="020F0502020204030204" pitchFamily="34" charset="0"/>
+              </a:rPr>
+              <a:t> sit </a:t>
+            </a:r>
+            <a:r>
+              <a:rPr lang="en-GB" sz="1600" b="0" i="0" dirty="0" err="1">
+                <a:solidFill>
+                  <a:srgbClr val="000000"/>
+                </a:solidFill>
+                <a:effectLst/>
+                <a:latin typeface="Mid Century Sans" panose="020B0504020202020203" pitchFamily="34" charset="0"/>
+                <a:ea typeface="Gadugi" panose="020B0502040204020203" pitchFamily="34" charset="0"/>
+                <a:cs typeface="Calibri" panose="020F0502020204030204" pitchFamily="34" charset="0"/>
+              </a:rPr>
+              <a:t>amet</a:t>
+            </a:r>
+            <a:endParaRPr lang="en-GB" sz="1600" dirty="0">
+              <a:latin typeface="Mid Century Sans" panose="020B0504020202020203" pitchFamily="34" charset="0"/>
+              <a:ea typeface="Gadugi" panose="020B0502040204020203" pitchFamily="34" charset="0"/>
+              <a:cs typeface="Calibri" panose="020F0502020204030204" pitchFamily="34" charset="0"/>
+            </a:endParaRPr>
+          </a:p>
+          <a:p>
+            <a:pPr marL="0" indent="0">
+              <a:buNone/>
+            </a:pPr>
+            <a:r>
+              <a:rPr lang="en-GB" sz="1100" b="0" i="0" dirty="0">
+                <a:solidFill>
+                  <a:srgbClr val="000000"/>
+                </a:solidFill>
+                <a:effectLst/>
+                <a:latin typeface="Mid Century Sans" panose="020B0504020202020203" pitchFamily="34" charset="0"/>
+                <a:ea typeface="Gadugi" panose="020B0502040204020203" pitchFamily="34" charset="0"/>
+                <a:cs typeface="Calibri" panose="020F0502020204030204" pitchFamily="34" charset="0"/>
+              </a:rPr>
+              <a:t>Lorem ipsum </a:t>
+            </a:r>
+            <a:r>
+              <a:rPr lang="en-GB" sz="1100" b="0" i="0" dirty="0" err="1">
+                <a:solidFill>
+                  <a:srgbClr val="000000"/>
+                </a:solidFill>
+                <a:effectLst/>
+                <a:latin typeface="Mid Century Sans" panose="020B0504020202020203" pitchFamily="34" charset="0"/>
+                <a:ea typeface="Gadugi" panose="020B0502040204020203" pitchFamily="34" charset="0"/>
+                <a:cs typeface="Calibri" panose="020F0502020204030204" pitchFamily="34" charset="0"/>
+              </a:rPr>
+              <a:t>dolor</a:t>
+            </a:r>
+            <a:r>
+              <a:rPr lang="en-GB" sz="1100" b="0" i="0" dirty="0">
+                <a:solidFill>
+                  <a:srgbClr val="000000"/>
+                </a:solidFill>
+                <a:effectLst/>
+                <a:latin typeface="Mid Century Sans" panose="020B0504020202020203" pitchFamily="34" charset="0"/>
+                <a:ea typeface="Gadugi" panose="020B0502040204020203" pitchFamily="34" charset="0"/>
+                <a:cs typeface="Calibri" panose="020F0502020204030204" pitchFamily="34" charset="0"/>
+              </a:rPr>
+              <a:t> sit </a:t>
+            </a:r>
+            <a:r>
+              <a:rPr lang="en-GB" sz="1100" b="0" i="0" dirty="0" err="1">
+                <a:solidFill>
+                  <a:srgbClr val="000000"/>
+                </a:solidFill>
+                <a:effectLst/>
+                <a:latin typeface="Mid Century Sans" panose="020B0504020202020203" pitchFamily="34" charset="0"/>
+                <a:ea typeface="Gadugi" panose="020B0502040204020203" pitchFamily="34" charset="0"/>
+                <a:cs typeface="Calibri" panose="020F0502020204030204" pitchFamily="34" charset="0"/>
+              </a:rPr>
+              <a:t>amet</a:t>
+            </a:r>
+            <a:endParaRPr lang="en-GB" sz="1100" b="0" i="0" dirty="0">
+              <a:solidFill>
+                <a:srgbClr val="000000"/>
+              </a:solidFill>
+              <a:effectLst/>
+              <a:latin typeface="Mid Century Sans" panose="020B0504020202020203" pitchFamily="34" charset="0"/>
+              <a:ea typeface="Gadugi" panose="020B0502040204020203" pitchFamily="34" charset="0"/>
+              <a:cs typeface="Calibri" panose="020F0502020204030204" pitchFamily="34" charset="0"/>
+            </a:endParaRPr>
+          </a:p>
+          <a:p>
+            <a:pPr marL="0" indent="0">
+              <a:buNone/>
+            </a:pPr>
+            <a:endParaRPr lang="en-GB" sz="2400" dirty="0"/>
+          </a:p>
+        </p:txBody>
+      </p:sp>
+    </p:spTree>
+    <p:extLst>
+      <p:ext uri="{BB962C8B-B14F-4D97-AF65-F5344CB8AC3E}">
+        <p14:creationId xmlns:p14="http://schemas.microsoft.com/office/powerpoint/2010/main" val="631712274"/>
+      </p:ext>
+    </p:extLst>
+  </p:cSld>
+  <p:clrMapOvr>
+    <a:masterClrMapping/>
+  </p:clrMapOvr>
+</p:sld>
+</file>
+
+<file path=ppt/slides/slide13.xml><?xml version="1.0" encoding="utf-8"?>
+<p:sld xmlns:a="http://schemas.openxmlformats.org/drawingml/2006/main" xmlns:r="http://schemas.openxmlformats.org/officeDocument/2006/relationships" xmlns:p="http://schemas.openxmlformats.org/presentationml/2006/main">
+  <p:cSld>
+    <p:spTree>
+      <p:nvGrpSpPr>
+        <p:cNvPr id="1" name=""/>
+        <p:cNvGrpSpPr/>
+        <p:nvPr/>
+      </p:nvGrpSpPr>
+      <p:grpSpPr>
+        <a:xfrm>
+          <a:off x="0" y="0"/>
+          <a:ext cx="0" cy="0"/>
+          <a:chOff x="0" y="0"/>
+          <a:chExt cx="0" cy="0"/>
+        </a:xfrm>
+      </p:grpSpPr>
+      <p:sp>
+        <p:nvSpPr>
+          <p:cNvPr id="2" name="Title 1">
+            <a:extLst>
+              <a:ext uri="{FF2B5EF4-FFF2-40B4-BE49-F238E27FC236}">
+                <a16:creationId xmlns:a16="http://schemas.microsoft.com/office/drawing/2014/main" id="{539AB629-3A8A-B7D8-20E4-F862884889D9}"/>
+              </a:ext>
+            </a:extLst>
+          </p:cNvPr>
+          <p:cNvSpPr>
+            <a:spLocks noGrp="1"/>
+          </p:cNvSpPr>
+          <p:nvPr>
+            <p:ph type="title"/>
+          </p:nvPr>
+        </p:nvSpPr>
+        <p:spPr/>
+        <p:txBody>
+          <a:bodyPr/>
+          <a:lstStyle/>
+          <a:p>
+            <a:r>
+              <a:rPr lang="en-GB" dirty="0">
+                <a:latin typeface="Verdana" panose="020B0604030504040204" pitchFamily="34" charset="0"/>
+                <a:ea typeface="Verdana" panose="020B0604030504040204" pitchFamily="34" charset="0"/>
+              </a:rPr>
+              <a:t>Verdana</a:t>
+            </a:r>
+          </a:p>
+        </p:txBody>
+      </p:sp>
+      <p:sp>
+        <p:nvSpPr>
+          <p:cNvPr id="3" name="Content Placeholder 2">
+            <a:extLst>
+              <a:ext uri="{FF2B5EF4-FFF2-40B4-BE49-F238E27FC236}">
+                <a16:creationId xmlns:a16="http://schemas.microsoft.com/office/drawing/2014/main" id="{4780F379-B09C-400A-9F37-5C5D832281D5}"/>
+              </a:ext>
+            </a:extLst>
+          </p:cNvPr>
+          <p:cNvSpPr>
+            <a:spLocks noGrp="1"/>
+          </p:cNvSpPr>
+          <p:nvPr>
+            <p:ph idx="1"/>
+          </p:nvPr>
+        </p:nvSpPr>
+        <p:spPr/>
+        <p:txBody>
+          <a:bodyPr/>
+          <a:lstStyle/>
+          <a:p>
+            <a:pPr marL="0" indent="0">
+              <a:buNone/>
+            </a:pPr>
+            <a:r>
+              <a:rPr lang="en-GB" sz="3200" b="0" i="0" dirty="0">
+                <a:solidFill>
+                  <a:srgbClr val="000000"/>
+                </a:solidFill>
+                <a:effectLst/>
+                <a:latin typeface="Verdana" panose="020B0604030504040204" pitchFamily="34" charset="0"/>
+                <a:ea typeface="Verdana" panose="020B0604030504040204" pitchFamily="34" charset="0"/>
+                <a:cs typeface="Calibri" panose="020F0502020204030204" pitchFamily="34" charset="0"/>
+              </a:rPr>
+              <a:t>Lorem ipsum </a:t>
+            </a:r>
+            <a:r>
+              <a:rPr lang="en-GB" sz="3200" b="0" i="0" dirty="0" err="1">
+                <a:solidFill>
+                  <a:srgbClr val="000000"/>
+                </a:solidFill>
+                <a:effectLst/>
+                <a:latin typeface="Verdana" panose="020B0604030504040204" pitchFamily="34" charset="0"/>
+                <a:ea typeface="Verdana" panose="020B0604030504040204" pitchFamily="34" charset="0"/>
+                <a:cs typeface="Calibri" panose="020F0502020204030204" pitchFamily="34" charset="0"/>
+              </a:rPr>
+              <a:t>dolor</a:t>
+            </a:r>
+            <a:r>
+              <a:rPr lang="en-GB" sz="3200" b="0" i="0" dirty="0">
+                <a:solidFill>
+                  <a:srgbClr val="000000"/>
+                </a:solidFill>
+                <a:effectLst/>
+                <a:latin typeface="Verdana" panose="020B0604030504040204" pitchFamily="34" charset="0"/>
+                <a:ea typeface="Verdana" panose="020B0604030504040204" pitchFamily="34" charset="0"/>
+                <a:cs typeface="Calibri" panose="020F0502020204030204" pitchFamily="34" charset="0"/>
+              </a:rPr>
+              <a:t> sit </a:t>
+            </a:r>
+            <a:r>
+              <a:rPr lang="en-GB" sz="3200" b="0" i="0" dirty="0" err="1">
+                <a:solidFill>
+                  <a:srgbClr val="000000"/>
+                </a:solidFill>
+                <a:effectLst/>
+                <a:latin typeface="Verdana" panose="020B0604030504040204" pitchFamily="34" charset="0"/>
+                <a:ea typeface="Verdana" panose="020B0604030504040204" pitchFamily="34" charset="0"/>
+                <a:cs typeface="Calibri" panose="020F0502020204030204" pitchFamily="34" charset="0"/>
+              </a:rPr>
+              <a:t>amet</a:t>
+            </a:r>
+            <a:endParaRPr lang="en-GB" sz="3200" b="0" i="0" dirty="0">
+              <a:solidFill>
+                <a:srgbClr val="000000"/>
+              </a:solidFill>
+              <a:effectLst/>
+              <a:latin typeface="Verdana" panose="020B0604030504040204" pitchFamily="34" charset="0"/>
+              <a:ea typeface="Verdana" panose="020B0604030504040204" pitchFamily="34" charset="0"/>
+              <a:cs typeface="Calibri" panose="020F0502020204030204" pitchFamily="34" charset="0"/>
+            </a:endParaRPr>
+          </a:p>
+          <a:p>
+            <a:pPr marL="0" indent="0">
+              <a:buNone/>
+            </a:pPr>
+            <a:r>
+              <a:rPr lang="en-GB" sz="2400" b="0" i="0" dirty="0">
+                <a:solidFill>
+                  <a:srgbClr val="000000"/>
+                </a:solidFill>
+                <a:effectLst/>
+                <a:latin typeface="Verdana" panose="020B0604030504040204" pitchFamily="34" charset="0"/>
+                <a:ea typeface="Verdana" panose="020B0604030504040204" pitchFamily="34" charset="0"/>
+                <a:cs typeface="Calibri" panose="020F0502020204030204" pitchFamily="34" charset="0"/>
+              </a:rPr>
+              <a:t>Lorem ipsum </a:t>
+            </a:r>
+            <a:r>
+              <a:rPr lang="en-GB" sz="2400" b="0" i="0" dirty="0" err="1">
+                <a:solidFill>
+                  <a:srgbClr val="000000"/>
+                </a:solidFill>
+                <a:effectLst/>
+                <a:latin typeface="Verdana" panose="020B0604030504040204" pitchFamily="34" charset="0"/>
+                <a:ea typeface="Verdana" panose="020B0604030504040204" pitchFamily="34" charset="0"/>
+                <a:cs typeface="Calibri" panose="020F0502020204030204" pitchFamily="34" charset="0"/>
+              </a:rPr>
+              <a:t>dolor</a:t>
+            </a:r>
+            <a:r>
+              <a:rPr lang="en-GB" sz="2400" b="0" i="0" dirty="0">
+                <a:solidFill>
+                  <a:srgbClr val="000000"/>
+                </a:solidFill>
+                <a:effectLst/>
+                <a:latin typeface="Verdana" panose="020B0604030504040204" pitchFamily="34" charset="0"/>
+                <a:ea typeface="Verdana" panose="020B0604030504040204" pitchFamily="34" charset="0"/>
+                <a:cs typeface="Calibri" panose="020F0502020204030204" pitchFamily="34" charset="0"/>
+              </a:rPr>
+              <a:t> sit </a:t>
+            </a:r>
+            <a:r>
+              <a:rPr lang="en-GB" sz="2400" b="0" i="0" dirty="0" err="1">
+                <a:solidFill>
+                  <a:srgbClr val="000000"/>
+                </a:solidFill>
+                <a:effectLst/>
+                <a:latin typeface="Verdana" panose="020B0604030504040204" pitchFamily="34" charset="0"/>
+                <a:ea typeface="Verdana" panose="020B0604030504040204" pitchFamily="34" charset="0"/>
+                <a:cs typeface="Calibri" panose="020F0502020204030204" pitchFamily="34" charset="0"/>
+              </a:rPr>
+              <a:t>amet</a:t>
+            </a:r>
+            <a:endParaRPr lang="en-GB" sz="2400" b="0" i="0" dirty="0">
+              <a:solidFill>
+                <a:srgbClr val="000000"/>
+              </a:solidFill>
+              <a:effectLst/>
+              <a:latin typeface="Verdana" panose="020B0604030504040204" pitchFamily="34" charset="0"/>
+              <a:ea typeface="Verdana" panose="020B0604030504040204" pitchFamily="34" charset="0"/>
+              <a:cs typeface="Calibri" panose="020F0502020204030204" pitchFamily="34" charset="0"/>
+            </a:endParaRPr>
+          </a:p>
+          <a:p>
+            <a:pPr marL="0" indent="0">
+              <a:buNone/>
+            </a:pPr>
+            <a:r>
+              <a:rPr lang="en-GB" sz="2000" b="0" i="0" dirty="0">
+                <a:solidFill>
+                  <a:srgbClr val="000000"/>
+                </a:solidFill>
+                <a:effectLst/>
+                <a:latin typeface="Verdana" panose="020B0604030504040204" pitchFamily="34" charset="0"/>
+                <a:ea typeface="Verdana" panose="020B0604030504040204" pitchFamily="34" charset="0"/>
+                <a:cs typeface="Calibri" panose="020F0502020204030204" pitchFamily="34" charset="0"/>
+              </a:rPr>
+              <a:t>Lorem ipsum </a:t>
+            </a:r>
+            <a:r>
+              <a:rPr lang="en-GB" sz="2000" b="0" i="0" dirty="0" err="1">
+                <a:solidFill>
+                  <a:srgbClr val="000000"/>
+                </a:solidFill>
+                <a:effectLst/>
+                <a:latin typeface="Verdana" panose="020B0604030504040204" pitchFamily="34" charset="0"/>
+                <a:ea typeface="Verdana" panose="020B0604030504040204" pitchFamily="34" charset="0"/>
+                <a:cs typeface="Calibri" panose="020F0502020204030204" pitchFamily="34" charset="0"/>
+              </a:rPr>
+              <a:t>dolor</a:t>
+            </a:r>
+            <a:r>
+              <a:rPr lang="en-GB" sz="2000" b="0" i="0" dirty="0">
+                <a:solidFill>
+                  <a:srgbClr val="000000"/>
+                </a:solidFill>
+                <a:effectLst/>
+                <a:latin typeface="Verdana" panose="020B0604030504040204" pitchFamily="34" charset="0"/>
+                <a:ea typeface="Verdana" panose="020B0604030504040204" pitchFamily="34" charset="0"/>
+                <a:cs typeface="Calibri" panose="020F0502020204030204" pitchFamily="34" charset="0"/>
+              </a:rPr>
+              <a:t> sit </a:t>
+            </a:r>
+            <a:r>
+              <a:rPr lang="en-GB" sz="2000" b="0" i="0" dirty="0" err="1">
+                <a:solidFill>
+                  <a:srgbClr val="000000"/>
+                </a:solidFill>
+                <a:effectLst/>
+                <a:latin typeface="Verdana" panose="020B0604030504040204" pitchFamily="34" charset="0"/>
+                <a:ea typeface="Verdana" panose="020B0604030504040204" pitchFamily="34" charset="0"/>
+                <a:cs typeface="Calibri" panose="020F0502020204030204" pitchFamily="34" charset="0"/>
+              </a:rPr>
+              <a:t>amet</a:t>
+            </a:r>
+            <a:endParaRPr lang="en-GB" sz="2000" dirty="0">
+              <a:solidFill>
+                <a:srgbClr val="000000"/>
+              </a:solidFill>
+              <a:latin typeface="Verdana" panose="020B0604030504040204" pitchFamily="34" charset="0"/>
+              <a:ea typeface="Verdana" panose="020B0604030504040204" pitchFamily="34" charset="0"/>
+              <a:cs typeface="Calibri" panose="020F0502020204030204" pitchFamily="34" charset="0"/>
+            </a:endParaRPr>
+          </a:p>
+          <a:p>
+            <a:pPr marL="0" indent="0">
+              <a:buNone/>
+            </a:pPr>
+            <a:r>
+              <a:rPr lang="en-GB" sz="1600" b="0" i="0" dirty="0">
+                <a:solidFill>
+                  <a:srgbClr val="000000"/>
+                </a:solidFill>
+                <a:effectLst/>
+                <a:latin typeface="Verdana" panose="020B0604030504040204" pitchFamily="34" charset="0"/>
+                <a:ea typeface="Verdana" panose="020B0604030504040204" pitchFamily="34" charset="0"/>
+                <a:cs typeface="Calibri" panose="020F0502020204030204" pitchFamily="34" charset="0"/>
+              </a:rPr>
+              <a:t>Lorem ipsum </a:t>
+            </a:r>
+            <a:r>
+              <a:rPr lang="en-GB" sz="1600" b="0" i="0" dirty="0" err="1">
+                <a:solidFill>
+                  <a:srgbClr val="000000"/>
+                </a:solidFill>
+                <a:effectLst/>
+                <a:latin typeface="Verdana" panose="020B0604030504040204" pitchFamily="34" charset="0"/>
+                <a:ea typeface="Verdana" panose="020B0604030504040204" pitchFamily="34" charset="0"/>
+                <a:cs typeface="Calibri" panose="020F0502020204030204" pitchFamily="34" charset="0"/>
+              </a:rPr>
+              <a:t>dolor</a:t>
+            </a:r>
+            <a:r>
+              <a:rPr lang="en-GB" sz="1600" b="0" i="0" dirty="0">
+                <a:solidFill>
+                  <a:srgbClr val="000000"/>
+                </a:solidFill>
+                <a:effectLst/>
+                <a:latin typeface="Verdana" panose="020B0604030504040204" pitchFamily="34" charset="0"/>
+                <a:ea typeface="Verdana" panose="020B0604030504040204" pitchFamily="34" charset="0"/>
+                <a:cs typeface="Calibri" panose="020F0502020204030204" pitchFamily="34" charset="0"/>
+              </a:rPr>
+              <a:t> sit </a:t>
+            </a:r>
+            <a:r>
+              <a:rPr lang="en-GB" sz="1600" b="0" i="0" dirty="0" err="1">
+                <a:solidFill>
+                  <a:srgbClr val="000000"/>
+                </a:solidFill>
+                <a:effectLst/>
+                <a:latin typeface="Verdana" panose="020B0604030504040204" pitchFamily="34" charset="0"/>
+                <a:ea typeface="Verdana" panose="020B0604030504040204" pitchFamily="34" charset="0"/>
+                <a:cs typeface="Calibri" panose="020F0502020204030204" pitchFamily="34" charset="0"/>
+              </a:rPr>
+              <a:t>amet</a:t>
+            </a:r>
+            <a:endParaRPr lang="en-GB" sz="1600" dirty="0">
+              <a:latin typeface="Verdana" panose="020B0604030504040204" pitchFamily="34" charset="0"/>
+              <a:ea typeface="Verdana" panose="020B0604030504040204" pitchFamily="34" charset="0"/>
+              <a:cs typeface="Calibri" panose="020F0502020204030204" pitchFamily="34" charset="0"/>
+            </a:endParaRPr>
+          </a:p>
+          <a:p>
+            <a:pPr marL="0" indent="0">
+              <a:buNone/>
+            </a:pPr>
+            <a:r>
+              <a:rPr lang="en-GB" sz="1100" b="0" i="0" dirty="0">
+                <a:solidFill>
+                  <a:srgbClr val="000000"/>
+                </a:solidFill>
+                <a:effectLst/>
+                <a:latin typeface="Verdana" panose="020B0604030504040204" pitchFamily="34" charset="0"/>
+                <a:ea typeface="Verdana" panose="020B0604030504040204" pitchFamily="34" charset="0"/>
+                <a:cs typeface="Calibri" panose="020F0502020204030204" pitchFamily="34" charset="0"/>
+              </a:rPr>
+              <a:t>Lorem ipsum </a:t>
+            </a:r>
+            <a:r>
+              <a:rPr lang="en-GB" sz="1100" b="0" i="0" dirty="0" err="1">
+                <a:solidFill>
+                  <a:srgbClr val="000000"/>
+                </a:solidFill>
+                <a:effectLst/>
+                <a:latin typeface="Verdana" panose="020B0604030504040204" pitchFamily="34" charset="0"/>
+                <a:ea typeface="Verdana" panose="020B0604030504040204" pitchFamily="34" charset="0"/>
+                <a:cs typeface="Calibri" panose="020F0502020204030204" pitchFamily="34" charset="0"/>
+              </a:rPr>
+              <a:t>dolor</a:t>
+            </a:r>
+            <a:r>
+              <a:rPr lang="en-GB" sz="1100" b="0" i="0" dirty="0">
+                <a:solidFill>
+                  <a:srgbClr val="000000"/>
+                </a:solidFill>
+                <a:effectLst/>
+                <a:latin typeface="Verdana" panose="020B0604030504040204" pitchFamily="34" charset="0"/>
+                <a:ea typeface="Verdana" panose="020B0604030504040204" pitchFamily="34" charset="0"/>
+                <a:cs typeface="Calibri" panose="020F0502020204030204" pitchFamily="34" charset="0"/>
+              </a:rPr>
+              <a:t> sit </a:t>
+            </a:r>
+            <a:r>
+              <a:rPr lang="en-GB" sz="1100" b="0" i="0" dirty="0" err="1">
+                <a:solidFill>
+                  <a:srgbClr val="000000"/>
+                </a:solidFill>
+                <a:effectLst/>
+                <a:latin typeface="Verdana" panose="020B0604030504040204" pitchFamily="34" charset="0"/>
+                <a:ea typeface="Verdana" panose="020B0604030504040204" pitchFamily="34" charset="0"/>
+                <a:cs typeface="Calibri" panose="020F0502020204030204" pitchFamily="34" charset="0"/>
+              </a:rPr>
+              <a:t>amet</a:t>
+            </a:r>
+            <a:endParaRPr lang="en-GB" sz="1100" b="0" i="0" dirty="0">
+              <a:solidFill>
+                <a:srgbClr val="000000"/>
+              </a:solidFill>
+              <a:effectLst/>
+              <a:latin typeface="Verdana" panose="020B0604030504040204" pitchFamily="34" charset="0"/>
+              <a:ea typeface="Verdana" panose="020B0604030504040204" pitchFamily="34" charset="0"/>
+              <a:cs typeface="Calibri" panose="020F0502020204030204" pitchFamily="34" charset="0"/>
+            </a:endParaRPr>
+          </a:p>
+          <a:p>
+            <a:pPr marL="0" indent="0">
+              <a:buNone/>
+            </a:pPr>
+            <a:endParaRPr lang="en-GB" sz="2400" dirty="0"/>
+          </a:p>
+        </p:txBody>
+      </p:sp>
+    </p:spTree>
+    <p:extLst>
+      <p:ext uri="{BB962C8B-B14F-4D97-AF65-F5344CB8AC3E}">
+        <p14:creationId xmlns:p14="http://schemas.microsoft.com/office/powerpoint/2010/main" val="3344072403"/>
       </p:ext>
     </p:extLst>
   </p:cSld>
@@ -4900,7 +6321,7 @@
         </p:blipFill>
         <p:spPr>
           <a:xfrm>
-            <a:off x="6465453" y="187922"/>
+            <a:off x="6465451" y="0"/>
             <a:ext cx="5523345" cy="1269966"/>
           </a:xfrm>
           <a:prstGeom prst="rect">
@@ -4930,7 +6351,7 @@
         </p:blipFill>
         <p:spPr>
           <a:xfrm>
-            <a:off x="6465452" y="1591163"/>
+            <a:off x="6465451" y="1342234"/>
             <a:ext cx="5523345" cy="1231246"/>
           </a:xfrm>
           <a:prstGeom prst="rect">
@@ -4960,8 +6381,68 @@
         </p:blipFill>
         <p:spPr>
           <a:xfrm>
-            <a:off x="6465451" y="2955684"/>
+            <a:off x="6465451" y="2645748"/>
             <a:ext cx="5523345" cy="1277274"/>
+          </a:xfrm>
+          <a:prstGeom prst="rect">
+            <a:avLst/>
+          </a:prstGeom>
+        </p:spPr>
+      </p:pic>
+      <p:pic>
+        <p:nvPicPr>
+          <p:cNvPr id="6" name="Picture 5">
+            <a:extLst>
+              <a:ext uri="{FF2B5EF4-FFF2-40B4-BE49-F238E27FC236}">
+                <a16:creationId xmlns:a16="http://schemas.microsoft.com/office/drawing/2014/main" id="{6C87A800-07B4-037D-CFC0-E1CD1BA91878}"/>
+              </a:ext>
+            </a:extLst>
+          </p:cNvPr>
+          <p:cNvPicPr>
+            <a:picLocks noChangeAspect="1"/>
+          </p:cNvPicPr>
+          <p:nvPr/>
+        </p:nvPicPr>
+        <p:blipFill>
+          <a:blip r:embed="rId5"/>
+          <a:stretch>
+            <a:fillRect/>
+          </a:stretch>
+        </p:blipFill>
+        <p:spPr>
+          <a:xfrm>
+            <a:off x="6465450" y="3995290"/>
+            <a:ext cx="5523345" cy="1309600"/>
+          </a:xfrm>
+          <a:prstGeom prst="rect">
+            <a:avLst/>
+          </a:prstGeom>
+        </p:spPr>
+      </p:pic>
+      <p:pic>
+        <p:nvPicPr>
+          <p:cNvPr id="10" name="Picture 9">
+            <a:extLst>
+              <a:ext uri="{FF2B5EF4-FFF2-40B4-BE49-F238E27FC236}">
+                <a16:creationId xmlns:a16="http://schemas.microsoft.com/office/drawing/2014/main" id="{C9D8709D-A6FE-0CA6-2761-8AC4C4401849}"/>
+              </a:ext>
+            </a:extLst>
+          </p:cNvPr>
+          <p:cNvPicPr>
+            <a:picLocks noChangeAspect="1"/>
+          </p:cNvPicPr>
+          <p:nvPr/>
+        </p:nvPicPr>
+        <p:blipFill>
+          <a:blip r:embed="rId6"/>
+          <a:stretch>
+            <a:fillRect/>
+          </a:stretch>
+        </p:blipFill>
+        <p:spPr>
+          <a:xfrm>
+            <a:off x="6465449" y="5377158"/>
+            <a:ext cx="5523345" cy="1425473"/>
           </a:xfrm>
           <a:prstGeom prst="rect">
             <a:avLst/>
@@ -5020,8 +6501,16 @@
           <a:lstStyle/>
           <a:p>
             <a:r>
-              <a:rPr lang="en-GB" dirty="0"/>
-              <a:t>Font Type</a:t>
+              <a:rPr lang="en-GB" dirty="0" err="1">
+                <a:latin typeface="Acumin Pro Thin" panose="020B0204020202020204" pitchFamily="34" charset="0"/>
+              </a:rPr>
+              <a:t>Acumin</a:t>
+            </a:r>
+            <a:r>
+              <a:rPr lang="en-GB" dirty="0">
+                <a:latin typeface="Acumin Pro Thin" panose="020B0204020202020204" pitchFamily="34" charset="0"/>
+              </a:rPr>
+              <a:t> Pro Thin</a:t>
             </a:r>
           </a:p>
         </p:txBody>
@@ -5056,7 +6545,7 @@
                   <a:srgbClr val="000000"/>
                 </a:solidFill>
                 <a:effectLst/>
-                <a:latin typeface="Open Sans" panose="020B0606030504020204" pitchFamily="34" charset="0"/>
+                <a:latin typeface="Acumin Pro Thin" panose="020B0204020202020204" pitchFamily="34" charset="0"/>
               </a:rPr>
               <a:t>Lorem ipsum </a:t>
             </a:r>
@@ -5066,7 +6555,7 @@
                   <a:srgbClr val="000000"/>
                 </a:solidFill>
                 <a:effectLst/>
-                <a:latin typeface="Open Sans" panose="020B0606030504020204" pitchFamily="34" charset="0"/>
+                <a:latin typeface="Acumin Pro Thin" panose="020B0204020202020204" pitchFamily="34" charset="0"/>
               </a:rPr>
               <a:t>dolor</a:t>
             </a:r>
@@ -5076,7 +6565,7 @@
                   <a:srgbClr val="000000"/>
                 </a:solidFill>
                 <a:effectLst/>
-                <a:latin typeface="Open Sans" panose="020B0606030504020204" pitchFamily="34" charset="0"/>
+                <a:latin typeface="Acumin Pro Thin" panose="020B0204020202020204" pitchFamily="34" charset="0"/>
               </a:rPr>
               <a:t> sit </a:t>
             </a:r>
@@ -5086,7 +6575,7 @@
                   <a:srgbClr val="000000"/>
                 </a:solidFill>
                 <a:effectLst/>
-                <a:latin typeface="Open Sans" panose="020B0606030504020204" pitchFamily="34" charset="0"/>
+                <a:latin typeface="Acumin Pro Thin" panose="020B0204020202020204" pitchFamily="34" charset="0"/>
               </a:rPr>
               <a:t>amet</a:t>
             </a:r>
@@ -5095,7 +6584,7 @@
                 <a:srgbClr val="000000"/>
               </a:solidFill>
               <a:effectLst/>
-              <a:latin typeface="Open Sans" panose="020B0606030504020204" pitchFamily="34" charset="0"/>
+              <a:latin typeface="Acumin Pro Thin" panose="020B0204020202020204" pitchFamily="34" charset="0"/>
             </a:endParaRPr>
           </a:p>
           <a:p>
@@ -5108,7 +6597,7 @@
                   <a:srgbClr val="000000"/>
                 </a:solidFill>
                 <a:effectLst/>
-                <a:latin typeface="Open Sans" panose="020B0606030504020204" pitchFamily="34" charset="0"/>
+                <a:latin typeface="Acumin Pro Thin" panose="020B0204020202020204" pitchFamily="34" charset="0"/>
               </a:rPr>
               <a:t>Lorem ipsum </a:t>
             </a:r>
@@ -5118,7 +6607,7 @@
                   <a:srgbClr val="000000"/>
                 </a:solidFill>
                 <a:effectLst/>
-                <a:latin typeface="Open Sans" panose="020B0606030504020204" pitchFamily="34" charset="0"/>
+                <a:latin typeface="Acumin Pro Thin" panose="020B0204020202020204" pitchFamily="34" charset="0"/>
               </a:rPr>
               <a:t>dolor</a:t>
             </a:r>
@@ -5128,7 +6617,7 @@
                   <a:srgbClr val="000000"/>
                 </a:solidFill>
                 <a:effectLst/>
-                <a:latin typeface="Open Sans" panose="020B0606030504020204" pitchFamily="34" charset="0"/>
+                <a:latin typeface="Acumin Pro Thin" panose="020B0204020202020204" pitchFamily="34" charset="0"/>
               </a:rPr>
               <a:t> sit </a:t>
             </a:r>
@@ -5138,7 +6627,7 @@
                   <a:srgbClr val="000000"/>
                 </a:solidFill>
                 <a:effectLst/>
-                <a:latin typeface="Open Sans" panose="020B0606030504020204" pitchFamily="34" charset="0"/>
+                <a:latin typeface="Acumin Pro Thin" panose="020B0204020202020204" pitchFamily="34" charset="0"/>
               </a:rPr>
               <a:t>amet</a:t>
             </a:r>
@@ -5147,7 +6636,7 @@
                 <a:srgbClr val="000000"/>
               </a:solidFill>
               <a:effectLst/>
-              <a:latin typeface="Open Sans" panose="020B0606030504020204" pitchFamily="34" charset="0"/>
+              <a:latin typeface="Acumin Pro Thin" panose="020B0204020202020204" pitchFamily="34" charset="0"/>
             </a:endParaRPr>
           </a:p>
           <a:p>
@@ -5160,7 +6649,7 @@
                   <a:srgbClr val="000000"/>
                 </a:solidFill>
                 <a:effectLst/>
-                <a:latin typeface="Open Sans" panose="020B0606030504020204" pitchFamily="34" charset="0"/>
+                <a:latin typeface="Acumin Pro Thin" panose="020B0204020202020204" pitchFamily="34" charset="0"/>
               </a:rPr>
               <a:t>Lorem ipsum </a:t>
             </a:r>
@@ -5170,7 +6659,7 @@
                   <a:srgbClr val="000000"/>
                 </a:solidFill>
                 <a:effectLst/>
-                <a:latin typeface="Open Sans" panose="020B0606030504020204" pitchFamily="34" charset="0"/>
+                <a:latin typeface="Acumin Pro Thin" panose="020B0204020202020204" pitchFamily="34" charset="0"/>
               </a:rPr>
               <a:t>dolor</a:t>
             </a:r>
@@ -5180,7 +6669,7 @@
                   <a:srgbClr val="000000"/>
                 </a:solidFill>
                 <a:effectLst/>
-                <a:latin typeface="Open Sans" panose="020B0606030504020204" pitchFamily="34" charset="0"/>
+                <a:latin typeface="Acumin Pro Thin" panose="020B0204020202020204" pitchFamily="34" charset="0"/>
               </a:rPr>
               <a:t> sit </a:t>
             </a:r>
@@ -5190,7 +6679,7 @@
                   <a:srgbClr val="000000"/>
                 </a:solidFill>
                 <a:effectLst/>
-                <a:latin typeface="Open Sans" panose="020B0606030504020204" pitchFamily="34" charset="0"/>
+                <a:latin typeface="Acumin Pro Thin" panose="020B0204020202020204" pitchFamily="34" charset="0"/>
               </a:rPr>
               <a:t>amet</a:t>
             </a:r>
@@ -5198,7 +6687,7 @@
               <a:solidFill>
                 <a:srgbClr val="000000"/>
               </a:solidFill>
-              <a:latin typeface="Open Sans" panose="020B0606030504020204" pitchFamily="34" charset="0"/>
+              <a:latin typeface="Acumin Pro Thin" panose="020B0204020202020204" pitchFamily="34" charset="0"/>
             </a:endParaRPr>
           </a:p>
           <a:p>
@@ -5211,7 +6700,7 @@
                   <a:srgbClr val="000000"/>
                 </a:solidFill>
                 <a:effectLst/>
-                <a:latin typeface="Open Sans" panose="020B0606030504020204" pitchFamily="34" charset="0"/>
+                <a:latin typeface="Acumin Pro Thin" panose="020B0204020202020204" pitchFamily="34" charset="0"/>
               </a:rPr>
               <a:t>Lorem ipsum </a:t>
             </a:r>
@@ -5221,7 +6710,7 @@
                   <a:srgbClr val="000000"/>
                 </a:solidFill>
                 <a:effectLst/>
-                <a:latin typeface="Open Sans" panose="020B0606030504020204" pitchFamily="34" charset="0"/>
+                <a:latin typeface="Acumin Pro Thin" panose="020B0204020202020204" pitchFamily="34" charset="0"/>
               </a:rPr>
               <a:t>dolor</a:t>
             </a:r>
@@ -5231,7 +6720,7 @@
                   <a:srgbClr val="000000"/>
                 </a:solidFill>
                 <a:effectLst/>
-                <a:latin typeface="Open Sans" panose="020B0606030504020204" pitchFamily="34" charset="0"/>
+                <a:latin typeface="Acumin Pro Thin" panose="020B0204020202020204" pitchFamily="34" charset="0"/>
               </a:rPr>
               <a:t> sit </a:t>
             </a:r>
@@ -5241,11 +6730,13 @@
                   <a:srgbClr val="000000"/>
                 </a:solidFill>
                 <a:effectLst/>
-                <a:latin typeface="Open Sans" panose="020B0606030504020204" pitchFamily="34" charset="0"/>
+                <a:latin typeface="Acumin Pro Thin" panose="020B0204020202020204" pitchFamily="34" charset="0"/>
               </a:rPr>
               <a:t>amet</a:t>
             </a:r>
-            <a:endParaRPr lang="en-GB" sz="1600" dirty="0"/>
+            <a:endParaRPr lang="en-GB" sz="1600" dirty="0">
+              <a:latin typeface="Acumin Pro Thin" panose="020B0204020202020204" pitchFamily="34" charset="0"/>
+            </a:endParaRPr>
           </a:p>
           <a:p>
             <a:pPr marL="0" indent="0">
@@ -5257,7 +6748,7 @@
                   <a:srgbClr val="000000"/>
                 </a:solidFill>
                 <a:effectLst/>
-                <a:latin typeface="Open Sans" panose="020B0606030504020204" pitchFamily="34" charset="0"/>
+                <a:latin typeface="Acumin Pro Thin" panose="020B0204020202020204" pitchFamily="34" charset="0"/>
               </a:rPr>
               <a:t>Lorem ipsum </a:t>
             </a:r>
@@ -5267,7 +6758,7 @@
                   <a:srgbClr val="000000"/>
                 </a:solidFill>
                 <a:effectLst/>
-                <a:latin typeface="Open Sans" panose="020B0606030504020204" pitchFamily="34" charset="0"/>
+                <a:latin typeface="Acumin Pro Thin" panose="020B0204020202020204" pitchFamily="34" charset="0"/>
               </a:rPr>
               <a:t>dolor</a:t>
             </a:r>
@@ -5277,7 +6768,7 @@
                   <a:srgbClr val="000000"/>
                 </a:solidFill>
                 <a:effectLst/>
-                <a:latin typeface="Open Sans" panose="020B0606030504020204" pitchFamily="34" charset="0"/>
+                <a:latin typeface="Acumin Pro Thin" panose="020B0204020202020204" pitchFamily="34" charset="0"/>
               </a:rPr>
               <a:t> sit </a:t>
             </a:r>
@@ -5287,7 +6778,7 @@
                   <a:srgbClr val="000000"/>
                 </a:solidFill>
                 <a:effectLst/>
-                <a:latin typeface="Open Sans" panose="020B0606030504020204" pitchFamily="34" charset="0"/>
+                <a:latin typeface="Acumin Pro Thin" panose="020B0204020202020204" pitchFamily="34" charset="0"/>
               </a:rPr>
               <a:t>amet</a:t>
             </a:r>
@@ -5296,7 +6787,7 @@
                 <a:srgbClr val="000000"/>
               </a:solidFill>
               <a:effectLst/>
-              <a:latin typeface="Open Sans" panose="020B0606030504020204" pitchFamily="34" charset="0"/>
+              <a:latin typeface="Acumin Pro Thin" panose="020B0204020202020204" pitchFamily="34" charset="0"/>
             </a:endParaRPr>
           </a:p>
           <a:p>

</xml_diff>